<commit_message>
Added SRS and Update PPT(v1)
</commit_message>
<xml_diff>
--- a/doc/PPT/VIRTUAL CLOTHING SYSTEM (v1).pptx
+++ b/doc/PPT/VIRTUAL CLOTHING SYSTEM (v1).pptx
@@ -5,10 +5,10 @@
     <p:sldMasterId id="2147483648" r:id="rId1"/>
   </p:sldMasterIdLst>
   <p:notesMasterIdLst>
-    <p:notesMasterId r:id="rId13"/>
+    <p:notesMasterId r:id="rId15"/>
   </p:notesMasterIdLst>
   <p:handoutMasterIdLst>
-    <p:handoutMasterId r:id="rId14"/>
+    <p:handoutMasterId r:id="rId16"/>
   </p:handoutMasterIdLst>
   <p:sldIdLst>
     <p:sldId id="2596" r:id="rId2"/>
@@ -20,8 +20,10 @@
     <p:sldId id="2555" r:id="rId8"/>
     <p:sldId id="2571" r:id="rId9"/>
     <p:sldId id="2575" r:id="rId10"/>
-    <p:sldId id="2597" r:id="rId11"/>
-    <p:sldId id="2598" r:id="rId12"/>
+    <p:sldId id="2599" r:id="rId11"/>
+    <p:sldId id="2600" r:id="rId12"/>
+    <p:sldId id="2597" r:id="rId13"/>
+    <p:sldId id="2598" r:id="rId14"/>
   </p:sldIdLst>
   <p:sldSz cx="12192000" cy="6858000"/>
   <p:notesSz cx="6858000" cy="9144000"/>
@@ -242,7 +244,7 @@
           <a:p>
             <a:fld id="{0248B25D-8766-427E-8C9E-4845048D8DFC}" type="datetimeFigureOut">
               <a:rPr lang="en-US" smtClean="0"/>
-              <a:t>10-Mar-21</a:t>
+              <a:t>11-Mar-21</a:t>
             </a:fld>
             <a:endParaRPr lang="en-US" dirty="0"/>
           </a:p>
@@ -419,7 +421,7 @@
           <a:p>
             <a:fld id="{426F439B-391B-4B41-826A-951FCF412C34}" type="datetimeFigureOut">
               <a:rPr lang="en-US" smtClean="0"/>
-              <a:t>10-Mar-21</a:t>
+              <a:t>11-Mar-21</a:t>
             </a:fld>
             <a:endParaRPr lang="en-US" dirty="0"/>
           </a:p>
@@ -21397,10 +21399,10 @@
       </p:grpSpPr>
       <p:sp>
         <p:nvSpPr>
-          <p:cNvPr id="8" name="Title 7">
-            <a:extLst>
-              <a:ext uri="{FF2B5EF4-FFF2-40B4-BE49-F238E27FC236}">
-                <a16:creationId xmlns:a16="http://schemas.microsoft.com/office/drawing/2014/main" id="{82CF6249-E8D6-4E41-A28A-8BD088A67598}"/>
+          <p:cNvPr id="15" name="Title 14">
+            <a:extLst>
+              <a:ext uri="{FF2B5EF4-FFF2-40B4-BE49-F238E27FC236}">
+                <a16:creationId xmlns:a16="http://schemas.microsoft.com/office/drawing/2014/main" id="{4FC158BE-3134-4D36-8552-D540E12694DA}"/>
               </a:ext>
             </a:extLst>
           </p:cNvPr>
@@ -21417,131 +21419,21 @@
           <a:lstStyle/>
           <a:p>
             <a:r>
-              <a:rPr lang="en-US" dirty="0"/>
-              <a:t>Expected Outcomes</a:t>
-            </a:r>
-          </a:p>
-        </p:txBody>
-      </p:sp>
-      <p:sp>
-        <p:nvSpPr>
-          <p:cNvPr id="9" name="Text Placeholder 8">
-            <a:extLst>
-              <a:ext uri="{FF2B5EF4-FFF2-40B4-BE49-F238E27FC236}">
-                <a16:creationId xmlns:a16="http://schemas.microsoft.com/office/drawing/2014/main" id="{AE28FCB2-F3A1-4EE3-96D7-1083CD8B3255}"/>
-              </a:ext>
-            </a:extLst>
-          </p:cNvPr>
-          <p:cNvSpPr>
-            <a:spLocks noGrp="1"/>
-          </p:cNvSpPr>
-          <p:nvPr>
-            <p:ph type="body" sz="quarter" idx="12"/>
-          </p:nvPr>
-        </p:nvSpPr>
-        <p:spPr>
-          <a:xfrm>
-            <a:off x="5804427" y="2555668"/>
-            <a:ext cx="978568" cy="419787"/>
-          </a:xfrm>
-        </p:spPr>
-        <p:txBody>
-          <a:bodyPr>
-            <a:normAutofit/>
-          </a:bodyPr>
-          <a:lstStyle/>
-          <a:p>
-            <a:r>
-              <a:rPr lang="en-IN" dirty="0"/>
-              <a:t>P</a:t>
-            </a:r>
-            <a:r>
-              <a:rPr lang="en-US" dirty="0" err="1"/>
-              <a:t>rocess</a:t>
-            </a:r>
-            <a:endParaRPr lang="en-US" dirty="0"/>
-          </a:p>
-        </p:txBody>
-      </p:sp>
-      <p:sp>
-        <p:nvSpPr>
-          <p:cNvPr id="10" name="Text Placeholder 9">
-            <a:extLst>
-              <a:ext uri="{FF2B5EF4-FFF2-40B4-BE49-F238E27FC236}">
-                <a16:creationId xmlns:a16="http://schemas.microsoft.com/office/drawing/2014/main" id="{A74285FD-F548-44F7-A6BD-D87551A30767}"/>
-              </a:ext>
-            </a:extLst>
-          </p:cNvPr>
-          <p:cNvSpPr>
-            <a:spLocks noGrp="1"/>
-          </p:cNvSpPr>
-          <p:nvPr>
-            <p:ph type="body" sz="quarter" idx="14"/>
-          </p:nvPr>
-        </p:nvSpPr>
-        <p:spPr>
-          <a:xfrm>
-            <a:off x="9491812" y="2532070"/>
-            <a:ext cx="903187" cy="466984"/>
-          </a:xfrm>
-        </p:spPr>
-        <p:txBody>
-          <a:bodyPr/>
-          <a:lstStyle/>
-          <a:p>
-            <a:r>
-              <a:rPr lang="en-US" dirty="0"/>
-              <a:t>Output</a:t>
-            </a:r>
-          </a:p>
-        </p:txBody>
-      </p:sp>
-      <p:sp>
-        <p:nvSpPr>
-          <p:cNvPr id="14" name="TextBox 13">
-            <a:extLst>
-              <a:ext uri="{FF2B5EF4-FFF2-40B4-BE49-F238E27FC236}">
-                <a16:creationId xmlns:a16="http://schemas.microsoft.com/office/drawing/2014/main" id="{88081F08-4804-4152-826B-1BCADBD584A6}"/>
-              </a:ext>
-            </a:extLst>
-          </p:cNvPr>
-          <p:cNvSpPr txBox="1"/>
-          <p:nvPr/>
-        </p:nvSpPr>
-        <p:spPr>
-          <a:xfrm>
-            <a:off x="876685" y="1566253"/>
-            <a:ext cx="10834052" cy="646331"/>
-          </a:xfrm>
-          <a:prstGeom prst="rect">
-            <a:avLst/>
-          </a:prstGeom>
-          <a:noFill/>
-        </p:spPr>
-        <p:txBody>
-          <a:bodyPr wrap="square">
-            <a:spAutoFit/>
-          </a:bodyPr>
-          <a:lstStyle/>
-          <a:p>
-            <a:pPr algn="l"/>
-            <a:r>
-              <a:rPr lang="en-US" sz="1800" dirty="0"/>
-              <a:t>The final output expecting as a 3d model of user with perfect outfit virtually .</a:t>
-            </a:r>
-          </a:p>
-          <a:p>
-            <a:pPr algn="l"/>
-            <a:endParaRPr lang="en-US" dirty="0"/>
+              <a:rPr lang="en-US" dirty="0">
+                <a:latin typeface="Times New Roman" panose="02020603050405020304" pitchFamily="18" charset="0"/>
+                <a:cs typeface="Times New Roman" panose="02020603050405020304" pitchFamily="18" charset="0"/>
+              </a:rPr>
+              <a:t>Data Flow Diagram (DFD)</a:t>
+            </a:r>
           </a:p>
         </p:txBody>
       </p:sp>
       <p:pic>
         <p:nvPicPr>
-          <p:cNvPr id="15" name="Picture 14">
-            <a:extLst>
-              <a:ext uri="{FF2B5EF4-FFF2-40B4-BE49-F238E27FC236}">
-                <a16:creationId xmlns:a16="http://schemas.microsoft.com/office/drawing/2014/main" id="{3D4AE7AB-F823-4CC7-BC18-DCCE320D137F}"/>
+          <p:cNvPr id="3" name="Picture 2">
+            <a:extLst>
+              <a:ext uri="{FF2B5EF4-FFF2-40B4-BE49-F238E27FC236}">
+                <a16:creationId xmlns:a16="http://schemas.microsoft.com/office/drawing/2014/main" id="{FA7C888D-FA18-4CAF-AC93-AF8506105A2E}"/>
               </a:ext>
             </a:extLst>
           </p:cNvPr>
@@ -21558,327 +21450,8 @@
         </p:blipFill>
         <p:spPr>
           <a:xfrm>
-            <a:off x="5106785" y="3232488"/>
-            <a:ext cx="1978429" cy="3355348"/>
-          </a:xfrm>
-          <a:prstGeom prst="rect">
-            <a:avLst/>
-          </a:prstGeom>
-        </p:spPr>
-      </p:pic>
-      <p:pic>
-        <p:nvPicPr>
-          <p:cNvPr id="17" name="Picture 16">
-            <a:extLst>
-              <a:ext uri="{FF2B5EF4-FFF2-40B4-BE49-F238E27FC236}">
-                <a16:creationId xmlns:a16="http://schemas.microsoft.com/office/drawing/2014/main" id="{DB4A6DC9-CB4F-476E-AF19-7A91D0AEA856}"/>
-              </a:ext>
-            </a:extLst>
-          </p:cNvPr>
-          <p:cNvPicPr>
-            <a:picLocks noChangeAspect="1"/>
-          </p:cNvPicPr>
-          <p:nvPr/>
-        </p:nvPicPr>
-        <p:blipFill>
-          <a:blip r:embed="rId3"/>
-          <a:stretch>
-            <a:fillRect/>
-          </a:stretch>
-        </p:blipFill>
-        <p:spPr>
-          <a:xfrm>
-            <a:off x="7194781" y="4506070"/>
-            <a:ext cx="768695" cy="381930"/>
-          </a:xfrm>
-          <a:prstGeom prst="rect">
-            <a:avLst/>
-          </a:prstGeom>
-        </p:spPr>
-      </p:pic>
-      <p:pic>
-        <p:nvPicPr>
-          <p:cNvPr id="20" name="Picture 19">
-            <a:extLst>
-              <a:ext uri="{FF2B5EF4-FFF2-40B4-BE49-F238E27FC236}">
-                <a16:creationId xmlns:a16="http://schemas.microsoft.com/office/drawing/2014/main" id="{3753BBC7-5D8E-467C-B615-825EA7ED51D0}"/>
-              </a:ext>
-            </a:extLst>
-          </p:cNvPr>
-          <p:cNvPicPr>
-            <a:picLocks noChangeAspect="1"/>
-          </p:cNvPicPr>
-          <p:nvPr/>
-        </p:nvPicPr>
-        <p:blipFill>
-          <a:blip r:embed="rId4"/>
-          <a:stretch>
-            <a:fillRect/>
-          </a:stretch>
-        </p:blipFill>
-        <p:spPr>
-          <a:xfrm>
-            <a:off x="8073043" y="3232488"/>
-            <a:ext cx="3740727" cy="3266902"/>
-          </a:xfrm>
-          <a:prstGeom prst="rect">
-            <a:avLst/>
-          </a:prstGeom>
-        </p:spPr>
-      </p:pic>
-      <p:pic>
-        <p:nvPicPr>
-          <p:cNvPr id="22" name="Picture 21">
-            <a:extLst>
-              <a:ext uri="{FF2B5EF4-FFF2-40B4-BE49-F238E27FC236}">
-                <a16:creationId xmlns:a16="http://schemas.microsoft.com/office/drawing/2014/main" id="{47D2B27A-84CF-4C03-BE7B-7252DEC339FD}"/>
-              </a:ext>
-            </a:extLst>
-          </p:cNvPr>
-          <p:cNvPicPr>
-            <a:picLocks noChangeAspect="1"/>
-          </p:cNvPicPr>
-          <p:nvPr/>
-        </p:nvPicPr>
-        <p:blipFill>
-          <a:blip r:embed="rId5"/>
-          <a:stretch>
-            <a:fillRect/>
-          </a:stretch>
-        </p:blipFill>
-        <p:spPr>
-          <a:xfrm>
-            <a:off x="778307" y="3205977"/>
-            <a:ext cx="2338283" cy="3293413"/>
-          </a:xfrm>
-          <a:prstGeom prst="rect">
-            <a:avLst/>
-          </a:prstGeom>
-        </p:spPr>
-      </p:pic>
-      <p:sp>
-        <p:nvSpPr>
-          <p:cNvPr id="23" name="Text Placeholder 8">
-            <a:extLst>
-              <a:ext uri="{FF2B5EF4-FFF2-40B4-BE49-F238E27FC236}">
-                <a16:creationId xmlns:a16="http://schemas.microsoft.com/office/drawing/2014/main" id="{D8DC69B9-354E-4701-8A7F-672FFA5BDF63}"/>
-              </a:ext>
-            </a:extLst>
-          </p:cNvPr>
-          <p:cNvSpPr txBox="1">
-            <a:spLocks/>
-          </p:cNvSpPr>
-          <p:nvPr/>
-        </p:nvSpPr>
-        <p:spPr>
-          <a:xfrm>
-            <a:off x="1649282" y="2555668"/>
-            <a:ext cx="878933" cy="419787"/>
-          </a:xfrm>
-          <a:prstGeom prst="rect">
-            <a:avLst/>
-          </a:prstGeom>
-        </p:spPr>
-        <p:txBody>
-          <a:bodyPr vert="horz" lIns="0" tIns="45720" rIns="91440" bIns="45720" rtlCol="0" anchor="b">
-            <a:normAutofit/>
-          </a:bodyPr>
-          <a:lstStyle>
-            <a:lvl1pPr marL="0" indent="0" algn="l" defTabSz="914400" rtl="0" eaLnBrk="1" latinLnBrk="0" hangingPunct="1">
-              <a:lnSpc>
-                <a:spcPct val="90000"/>
-              </a:lnSpc>
-              <a:spcBef>
-                <a:spcPts val="1000"/>
-              </a:spcBef>
-              <a:buFont typeface="Arial" panose="020B0604020202020204" pitchFamily="34" charset="0"/>
-              <a:buNone/>
-              <a:defRPr sz="1600" b="1" i="0" kern="1200">
-                <a:solidFill>
-                  <a:schemeClr val="bg1"/>
-                </a:solidFill>
-                <a:latin typeface="+mj-lt"/>
-                <a:ea typeface="+mn-ea"/>
-                <a:cs typeface="Arial" panose="020B0604020202020204" pitchFamily="34" charset="0"/>
-              </a:defRPr>
-            </a:lvl1pPr>
-            <a:lvl2pPr marL="685800" indent="-228600" algn="l" defTabSz="914400" rtl="0" eaLnBrk="1" latinLnBrk="0" hangingPunct="1">
-              <a:lnSpc>
-                <a:spcPct val="90000"/>
-              </a:lnSpc>
-              <a:spcBef>
-                <a:spcPts val="500"/>
-              </a:spcBef>
-              <a:buFont typeface="Arial" panose="020B0604020202020204" pitchFamily="34" charset="0"/>
-              <a:buChar char="•"/>
-              <a:defRPr sz="1800" b="0" i="0" kern="1200">
-                <a:solidFill>
-                  <a:schemeClr val="tx2"/>
-                </a:solidFill>
-                <a:latin typeface="+mn-lt"/>
-                <a:ea typeface="+mn-ea"/>
-                <a:cs typeface="Arial" panose="020B0604020202020204" pitchFamily="34" charset="0"/>
-              </a:defRPr>
-            </a:lvl2pPr>
-            <a:lvl3pPr marL="1143000" indent="-228600" algn="l" defTabSz="914400" rtl="0" eaLnBrk="1" latinLnBrk="0" hangingPunct="1">
-              <a:lnSpc>
-                <a:spcPct val="90000"/>
-              </a:lnSpc>
-              <a:spcBef>
-                <a:spcPts val="500"/>
-              </a:spcBef>
-              <a:buFont typeface="Arial" panose="020B0604020202020204" pitchFamily="34" charset="0"/>
-              <a:buChar char="•"/>
-              <a:defRPr sz="1600" b="0" i="0" kern="1200">
-                <a:solidFill>
-                  <a:schemeClr val="tx2"/>
-                </a:solidFill>
-                <a:latin typeface="+mn-lt"/>
-                <a:ea typeface="+mn-ea"/>
-                <a:cs typeface="Arial" panose="020B0604020202020204" pitchFamily="34" charset="0"/>
-              </a:defRPr>
-            </a:lvl3pPr>
-            <a:lvl4pPr marL="1600200" indent="-228600" algn="l" defTabSz="914400" rtl="0" eaLnBrk="1" latinLnBrk="0" hangingPunct="1">
-              <a:lnSpc>
-                <a:spcPct val="90000"/>
-              </a:lnSpc>
-              <a:spcBef>
-                <a:spcPts val="500"/>
-              </a:spcBef>
-              <a:buFont typeface="Arial" panose="020B0604020202020204" pitchFamily="34" charset="0"/>
-              <a:buChar char="•"/>
-              <a:defRPr sz="1400" b="0" i="0" kern="1200">
-                <a:solidFill>
-                  <a:schemeClr val="tx2"/>
-                </a:solidFill>
-                <a:latin typeface="+mn-lt"/>
-                <a:ea typeface="+mn-ea"/>
-                <a:cs typeface="Arial" panose="020B0604020202020204" pitchFamily="34" charset="0"/>
-              </a:defRPr>
-            </a:lvl4pPr>
-            <a:lvl5pPr marL="2057400" indent="-228600" algn="l" defTabSz="914400" rtl="0" eaLnBrk="1" latinLnBrk="0" hangingPunct="1">
-              <a:lnSpc>
-                <a:spcPct val="90000"/>
-              </a:lnSpc>
-              <a:spcBef>
-                <a:spcPts val="500"/>
-              </a:spcBef>
-              <a:buFont typeface="Arial" panose="020B0604020202020204" pitchFamily="34" charset="0"/>
-              <a:buChar char="•"/>
-              <a:defRPr sz="1400" b="0" i="0" kern="1200">
-                <a:solidFill>
-                  <a:schemeClr val="tx2"/>
-                </a:solidFill>
-                <a:latin typeface="+mn-lt"/>
-                <a:ea typeface="+mn-ea"/>
-                <a:cs typeface="Arial" panose="020B0604020202020204" pitchFamily="34" charset="0"/>
-              </a:defRPr>
-            </a:lvl5pPr>
-            <a:lvl6pPr marL="2514600" indent="-228600" algn="l" defTabSz="914400" rtl="0" eaLnBrk="1" latinLnBrk="0" hangingPunct="1">
-              <a:lnSpc>
-                <a:spcPct val="90000"/>
-              </a:lnSpc>
-              <a:spcBef>
-                <a:spcPts val="500"/>
-              </a:spcBef>
-              <a:buFont typeface="Arial" panose="020B0604020202020204" pitchFamily="34" charset="0"/>
-              <a:buChar char="•"/>
-              <a:defRPr sz="1800" kern="1200">
-                <a:solidFill>
-                  <a:schemeClr val="tx1"/>
-                </a:solidFill>
-                <a:latin typeface="+mn-lt"/>
-                <a:ea typeface="+mn-ea"/>
-                <a:cs typeface="+mn-cs"/>
-              </a:defRPr>
-            </a:lvl6pPr>
-            <a:lvl7pPr marL="2971800" indent="-228600" algn="l" defTabSz="914400" rtl="0" eaLnBrk="1" latinLnBrk="0" hangingPunct="1">
-              <a:lnSpc>
-                <a:spcPct val="90000"/>
-              </a:lnSpc>
-              <a:spcBef>
-                <a:spcPts val="500"/>
-              </a:spcBef>
-              <a:buFont typeface="Arial" panose="020B0604020202020204" pitchFamily="34" charset="0"/>
-              <a:buChar char="•"/>
-              <a:defRPr sz="1800" kern="1200">
-                <a:solidFill>
-                  <a:schemeClr val="tx1"/>
-                </a:solidFill>
-                <a:latin typeface="+mn-lt"/>
-                <a:ea typeface="+mn-ea"/>
-                <a:cs typeface="+mn-cs"/>
-              </a:defRPr>
-            </a:lvl7pPr>
-            <a:lvl8pPr marL="3429000" indent="-228600" algn="l" defTabSz="914400" rtl="0" eaLnBrk="1" latinLnBrk="0" hangingPunct="1">
-              <a:lnSpc>
-                <a:spcPct val="90000"/>
-              </a:lnSpc>
-              <a:spcBef>
-                <a:spcPts val="500"/>
-              </a:spcBef>
-              <a:buFont typeface="Arial" panose="020B0604020202020204" pitchFamily="34" charset="0"/>
-              <a:buChar char="•"/>
-              <a:defRPr sz="1800" kern="1200">
-                <a:solidFill>
-                  <a:schemeClr val="tx1"/>
-                </a:solidFill>
-                <a:latin typeface="+mn-lt"/>
-                <a:ea typeface="+mn-ea"/>
-                <a:cs typeface="+mn-cs"/>
-              </a:defRPr>
-            </a:lvl8pPr>
-            <a:lvl9pPr marL="3886200" indent="-228600" algn="l" defTabSz="914400" rtl="0" eaLnBrk="1" latinLnBrk="0" hangingPunct="1">
-              <a:lnSpc>
-                <a:spcPct val="90000"/>
-              </a:lnSpc>
-              <a:spcBef>
-                <a:spcPts val="500"/>
-              </a:spcBef>
-              <a:buFont typeface="Arial" panose="020B0604020202020204" pitchFamily="34" charset="0"/>
-              <a:buChar char="•"/>
-              <a:defRPr sz="1800" kern="1200">
-                <a:solidFill>
-                  <a:schemeClr val="tx1"/>
-                </a:solidFill>
-                <a:latin typeface="+mn-lt"/>
-                <a:ea typeface="+mn-ea"/>
-                <a:cs typeface="+mn-cs"/>
-              </a:defRPr>
-            </a:lvl9pPr>
-          </a:lstStyle>
-          <a:p>
-            <a:r>
-              <a:rPr lang="en-US" dirty="0"/>
-              <a:t>Input</a:t>
-            </a:r>
-          </a:p>
-        </p:txBody>
-      </p:sp>
-      <p:pic>
-        <p:nvPicPr>
-          <p:cNvPr id="24" name="Picture 23">
-            <a:extLst>
-              <a:ext uri="{FF2B5EF4-FFF2-40B4-BE49-F238E27FC236}">
-                <a16:creationId xmlns:a16="http://schemas.microsoft.com/office/drawing/2014/main" id="{84CC60BB-3F7A-4C1B-A194-104BDD32935F}"/>
-              </a:ext>
-            </a:extLst>
-          </p:cNvPr>
-          <p:cNvPicPr>
-            <a:picLocks noChangeAspect="1"/>
-          </p:cNvPicPr>
-          <p:nvPr/>
-        </p:nvPicPr>
-        <p:blipFill>
-          <a:blip r:embed="rId3"/>
-          <a:stretch>
-            <a:fillRect/>
-          </a:stretch>
-        </p:blipFill>
-        <p:spPr>
-          <a:xfrm>
-            <a:off x="3734608" y="4506070"/>
-            <a:ext cx="768695" cy="381930"/>
+            <a:off x="1881274" y="83126"/>
+            <a:ext cx="7295976" cy="4639837"/>
           </a:xfrm>
           <a:prstGeom prst="rect">
             <a:avLst/>
@@ -21888,7 +21461,7 @@
     </p:spTree>
     <p:extLst>
       <p:ext uri="{BB962C8B-B14F-4D97-AF65-F5344CB8AC3E}">
-        <p14:creationId xmlns:p14="http://schemas.microsoft.com/office/powerpoint/2010/main" val="2584108313"/>
+        <p14:creationId xmlns:p14="http://schemas.microsoft.com/office/powerpoint/2010/main" val="4124795838"/>
       </p:ext>
     </p:extLst>
   </p:cSld>
@@ -21917,10 +21490,10 @@
       </p:grpSpPr>
       <p:sp>
         <p:nvSpPr>
-          <p:cNvPr id="7" name="Title 6">
-            <a:extLst>
-              <a:ext uri="{FF2B5EF4-FFF2-40B4-BE49-F238E27FC236}">
-                <a16:creationId xmlns:a16="http://schemas.microsoft.com/office/drawing/2014/main" id="{E55529B5-AB4C-4634-9271-E22509CF7554}"/>
+          <p:cNvPr id="4" name="Title 3">
+            <a:extLst>
+              <a:ext uri="{FF2B5EF4-FFF2-40B4-BE49-F238E27FC236}">
+                <a16:creationId xmlns:a16="http://schemas.microsoft.com/office/drawing/2014/main" id="{4D170419-BD8C-41E3-A34A-291E52E04D8D}"/>
               </a:ext>
             </a:extLst>
           </p:cNvPr>
@@ -21938,14 +21511,629 @@
           <a:p>
             <a:r>
               <a:rPr lang="en-US" dirty="0">
-                <a:latin typeface="Cascadia Code" panose="020B0609020000020004" pitchFamily="49" charset="0"/>
-                <a:cs typeface="Cascadia Code" panose="020B0609020000020004" pitchFamily="49" charset="0"/>
+                <a:latin typeface="Times New Roman" panose="02020603050405020304" pitchFamily="18" charset="0"/>
+                <a:cs typeface="Times New Roman" panose="02020603050405020304" pitchFamily="18" charset="0"/>
               </a:rPr>
-              <a:t>30</a:t>
-            </a:r>
+              <a:t>Use Case Diagram </a:t>
+            </a:r>
+          </a:p>
+        </p:txBody>
+      </p:sp>
+      <p:pic>
+        <p:nvPicPr>
+          <p:cNvPr id="3" name="Picture 2">
+            <a:extLst>
+              <a:ext uri="{FF2B5EF4-FFF2-40B4-BE49-F238E27FC236}">
+                <a16:creationId xmlns:a16="http://schemas.microsoft.com/office/drawing/2014/main" id="{EA6697AA-C153-4597-B185-1096169C3984}"/>
+              </a:ext>
+            </a:extLst>
+          </p:cNvPr>
+          <p:cNvPicPr>
+            <a:picLocks noChangeAspect="1"/>
+          </p:cNvPicPr>
+          <p:nvPr/>
+        </p:nvPicPr>
+        <p:blipFill rotWithShape="1">
+          <a:blip r:embed="rId2"/>
+          <a:srcRect t="6077" b="5169"/>
+          <a:stretch/>
+        </p:blipFill>
+        <p:spPr>
+          <a:xfrm>
+            <a:off x="2683010" y="0"/>
+            <a:ext cx="6825980" cy="4728737"/>
+          </a:xfrm>
+          <a:prstGeom prst="rect">
+            <a:avLst/>
+          </a:prstGeom>
+        </p:spPr>
+      </p:pic>
+    </p:spTree>
+    <p:extLst>
+      <p:ext uri="{BB962C8B-B14F-4D97-AF65-F5344CB8AC3E}">
+        <p14:creationId xmlns:p14="http://schemas.microsoft.com/office/powerpoint/2010/main" val="2063225401"/>
+      </p:ext>
+    </p:extLst>
+  </p:cSld>
+  <p:clrMapOvr>
+    <a:masterClrMapping/>
+  </p:clrMapOvr>
+</p:sld>
+</file>
+
+<file path=ppt/slides/slide12.xml><?xml version="1.0" encoding="utf-8"?>
+<p:sld xmlns:a="http://schemas.openxmlformats.org/drawingml/2006/main" xmlns:r="http://schemas.openxmlformats.org/officeDocument/2006/relationships" xmlns:p="http://schemas.openxmlformats.org/presentationml/2006/main">
+  <p:cSld>
+    <p:spTree>
+      <p:nvGrpSpPr>
+        <p:cNvPr id="1" name=""/>
+        <p:cNvGrpSpPr/>
+        <p:nvPr/>
+      </p:nvGrpSpPr>
+      <p:grpSpPr>
+        <a:xfrm>
+          <a:off x="0" y="0"/>
+          <a:ext cx="0" cy="0"/>
+          <a:chOff x="0" y="0"/>
+          <a:chExt cx="0" cy="0"/>
+        </a:xfrm>
+      </p:grpSpPr>
+      <p:sp>
+        <p:nvSpPr>
+          <p:cNvPr id="8" name="Title 7">
+            <a:extLst>
+              <a:ext uri="{FF2B5EF4-FFF2-40B4-BE49-F238E27FC236}">
+                <a16:creationId xmlns:a16="http://schemas.microsoft.com/office/drawing/2014/main" id="{82CF6249-E8D6-4E41-A28A-8BD088A67598}"/>
+              </a:ext>
+            </a:extLst>
+          </p:cNvPr>
+          <p:cNvSpPr>
+            <a:spLocks noGrp="1"/>
+          </p:cNvSpPr>
+          <p:nvPr>
+            <p:ph type="title"/>
+          </p:nvPr>
+        </p:nvSpPr>
+        <p:spPr/>
+        <p:txBody>
+          <a:bodyPr/>
+          <a:lstStyle/>
+          <a:p>
+            <a:r>
+              <a:rPr lang="en-US" dirty="0">
+                <a:latin typeface="Times New Roman" panose="02020603050405020304" pitchFamily="18" charset="0"/>
+                <a:cs typeface="Times New Roman" panose="02020603050405020304" pitchFamily="18" charset="0"/>
+              </a:rPr>
+              <a:t>Expected Outcomes</a:t>
+            </a:r>
+          </a:p>
+        </p:txBody>
+      </p:sp>
+      <p:sp>
+        <p:nvSpPr>
+          <p:cNvPr id="9" name="Text Placeholder 8">
+            <a:extLst>
+              <a:ext uri="{FF2B5EF4-FFF2-40B4-BE49-F238E27FC236}">
+                <a16:creationId xmlns:a16="http://schemas.microsoft.com/office/drawing/2014/main" id="{AE28FCB2-F3A1-4EE3-96D7-1083CD8B3255}"/>
+              </a:ext>
+            </a:extLst>
+          </p:cNvPr>
+          <p:cNvSpPr>
+            <a:spLocks noGrp="1"/>
+          </p:cNvSpPr>
+          <p:nvPr>
+            <p:ph type="body" sz="quarter" idx="12"/>
+          </p:nvPr>
+        </p:nvSpPr>
+        <p:spPr>
+          <a:xfrm>
+            <a:off x="5804427" y="2555668"/>
+            <a:ext cx="978568" cy="419787"/>
+          </a:xfrm>
+        </p:spPr>
+        <p:txBody>
+          <a:bodyPr>
+            <a:normAutofit/>
+          </a:bodyPr>
+          <a:lstStyle/>
+          <a:p>
+            <a:r>
+              <a:rPr lang="en-IN" dirty="0"/>
+              <a:t>P</a:t>
+            </a:r>
+            <a:r>
+              <a:rPr lang="en-US" dirty="0" err="1"/>
+              <a:t>rocess</a:t>
+            </a:r>
+            <a:endParaRPr lang="en-US" dirty="0"/>
+          </a:p>
+        </p:txBody>
+      </p:sp>
+      <p:sp>
+        <p:nvSpPr>
+          <p:cNvPr id="10" name="Text Placeholder 9">
+            <a:extLst>
+              <a:ext uri="{FF2B5EF4-FFF2-40B4-BE49-F238E27FC236}">
+                <a16:creationId xmlns:a16="http://schemas.microsoft.com/office/drawing/2014/main" id="{A74285FD-F548-44F7-A6BD-D87551A30767}"/>
+              </a:ext>
+            </a:extLst>
+          </p:cNvPr>
+          <p:cNvSpPr>
+            <a:spLocks noGrp="1"/>
+          </p:cNvSpPr>
+          <p:nvPr>
+            <p:ph type="body" sz="quarter" idx="14"/>
+          </p:nvPr>
+        </p:nvSpPr>
+        <p:spPr>
+          <a:xfrm>
+            <a:off x="9491812" y="2532070"/>
+            <a:ext cx="903187" cy="466984"/>
+          </a:xfrm>
+        </p:spPr>
+        <p:txBody>
+          <a:bodyPr/>
+          <a:lstStyle/>
+          <a:p>
             <a:r>
               <a:rPr lang="en-US" dirty="0"/>
-              <a:t> % Code Implement</a:t>
+              <a:t>Output</a:t>
+            </a:r>
+          </a:p>
+        </p:txBody>
+      </p:sp>
+      <p:sp>
+        <p:nvSpPr>
+          <p:cNvPr id="14" name="TextBox 13">
+            <a:extLst>
+              <a:ext uri="{FF2B5EF4-FFF2-40B4-BE49-F238E27FC236}">
+                <a16:creationId xmlns:a16="http://schemas.microsoft.com/office/drawing/2014/main" id="{88081F08-4804-4152-826B-1BCADBD584A6}"/>
+              </a:ext>
+            </a:extLst>
+          </p:cNvPr>
+          <p:cNvSpPr txBox="1"/>
+          <p:nvPr/>
+        </p:nvSpPr>
+        <p:spPr>
+          <a:xfrm>
+            <a:off x="876685" y="1566253"/>
+            <a:ext cx="10834052" cy="646331"/>
+          </a:xfrm>
+          <a:prstGeom prst="rect">
+            <a:avLst/>
+          </a:prstGeom>
+          <a:noFill/>
+        </p:spPr>
+        <p:txBody>
+          <a:bodyPr wrap="square">
+            <a:spAutoFit/>
+          </a:bodyPr>
+          <a:lstStyle/>
+          <a:p>
+            <a:pPr algn="l"/>
+            <a:r>
+              <a:rPr lang="en-US" sz="1800" dirty="0">
+                <a:latin typeface="Times New Roman" panose="02020603050405020304" pitchFamily="18" charset="0"/>
+                <a:cs typeface="Times New Roman" panose="02020603050405020304" pitchFamily="18" charset="0"/>
+              </a:rPr>
+              <a:t>The final output expecting as a 3d model of user with perfect outfit virtually .</a:t>
+            </a:r>
+          </a:p>
+          <a:p>
+            <a:pPr algn="l"/>
+            <a:endParaRPr lang="en-US" dirty="0">
+              <a:latin typeface="Times New Roman" panose="02020603050405020304" pitchFamily="18" charset="0"/>
+              <a:cs typeface="Times New Roman" panose="02020603050405020304" pitchFamily="18" charset="0"/>
+            </a:endParaRPr>
+          </a:p>
+        </p:txBody>
+      </p:sp>
+      <p:pic>
+        <p:nvPicPr>
+          <p:cNvPr id="15" name="Picture 14">
+            <a:extLst>
+              <a:ext uri="{FF2B5EF4-FFF2-40B4-BE49-F238E27FC236}">
+                <a16:creationId xmlns:a16="http://schemas.microsoft.com/office/drawing/2014/main" id="{3D4AE7AB-F823-4CC7-BC18-DCCE320D137F}"/>
+              </a:ext>
+            </a:extLst>
+          </p:cNvPr>
+          <p:cNvPicPr>
+            <a:picLocks noChangeAspect="1"/>
+          </p:cNvPicPr>
+          <p:nvPr/>
+        </p:nvPicPr>
+        <p:blipFill>
+          <a:blip r:embed="rId2"/>
+          <a:stretch>
+            <a:fillRect/>
+          </a:stretch>
+        </p:blipFill>
+        <p:spPr>
+          <a:xfrm>
+            <a:off x="5106785" y="3232488"/>
+            <a:ext cx="1978429" cy="3355348"/>
+          </a:xfrm>
+          <a:prstGeom prst="rect">
+            <a:avLst/>
+          </a:prstGeom>
+        </p:spPr>
+      </p:pic>
+      <p:pic>
+        <p:nvPicPr>
+          <p:cNvPr id="17" name="Picture 16">
+            <a:extLst>
+              <a:ext uri="{FF2B5EF4-FFF2-40B4-BE49-F238E27FC236}">
+                <a16:creationId xmlns:a16="http://schemas.microsoft.com/office/drawing/2014/main" id="{DB4A6DC9-CB4F-476E-AF19-7A91D0AEA856}"/>
+              </a:ext>
+            </a:extLst>
+          </p:cNvPr>
+          <p:cNvPicPr>
+            <a:picLocks noChangeAspect="1"/>
+          </p:cNvPicPr>
+          <p:nvPr/>
+        </p:nvPicPr>
+        <p:blipFill>
+          <a:blip r:embed="rId3"/>
+          <a:stretch>
+            <a:fillRect/>
+          </a:stretch>
+        </p:blipFill>
+        <p:spPr>
+          <a:xfrm>
+            <a:off x="7194781" y="4506070"/>
+            <a:ext cx="768695" cy="381930"/>
+          </a:xfrm>
+          <a:prstGeom prst="rect">
+            <a:avLst/>
+          </a:prstGeom>
+        </p:spPr>
+      </p:pic>
+      <p:pic>
+        <p:nvPicPr>
+          <p:cNvPr id="20" name="Picture 19">
+            <a:extLst>
+              <a:ext uri="{FF2B5EF4-FFF2-40B4-BE49-F238E27FC236}">
+                <a16:creationId xmlns:a16="http://schemas.microsoft.com/office/drawing/2014/main" id="{3753BBC7-5D8E-467C-B615-825EA7ED51D0}"/>
+              </a:ext>
+            </a:extLst>
+          </p:cNvPr>
+          <p:cNvPicPr>
+            <a:picLocks noChangeAspect="1"/>
+          </p:cNvPicPr>
+          <p:nvPr/>
+        </p:nvPicPr>
+        <p:blipFill>
+          <a:blip r:embed="rId4"/>
+          <a:stretch>
+            <a:fillRect/>
+          </a:stretch>
+        </p:blipFill>
+        <p:spPr>
+          <a:xfrm>
+            <a:off x="8073043" y="3232488"/>
+            <a:ext cx="3740727" cy="3266902"/>
+          </a:xfrm>
+          <a:prstGeom prst="rect">
+            <a:avLst/>
+          </a:prstGeom>
+        </p:spPr>
+      </p:pic>
+      <p:pic>
+        <p:nvPicPr>
+          <p:cNvPr id="22" name="Picture 21">
+            <a:extLst>
+              <a:ext uri="{FF2B5EF4-FFF2-40B4-BE49-F238E27FC236}">
+                <a16:creationId xmlns:a16="http://schemas.microsoft.com/office/drawing/2014/main" id="{47D2B27A-84CF-4C03-BE7B-7252DEC339FD}"/>
+              </a:ext>
+            </a:extLst>
+          </p:cNvPr>
+          <p:cNvPicPr>
+            <a:picLocks noChangeAspect="1"/>
+          </p:cNvPicPr>
+          <p:nvPr/>
+        </p:nvPicPr>
+        <p:blipFill>
+          <a:blip r:embed="rId5"/>
+          <a:stretch>
+            <a:fillRect/>
+          </a:stretch>
+        </p:blipFill>
+        <p:spPr>
+          <a:xfrm>
+            <a:off x="778307" y="3205977"/>
+            <a:ext cx="2338283" cy="3293413"/>
+          </a:xfrm>
+          <a:prstGeom prst="rect">
+            <a:avLst/>
+          </a:prstGeom>
+        </p:spPr>
+      </p:pic>
+      <p:sp>
+        <p:nvSpPr>
+          <p:cNvPr id="23" name="Text Placeholder 8">
+            <a:extLst>
+              <a:ext uri="{FF2B5EF4-FFF2-40B4-BE49-F238E27FC236}">
+                <a16:creationId xmlns:a16="http://schemas.microsoft.com/office/drawing/2014/main" id="{D8DC69B9-354E-4701-8A7F-672FFA5BDF63}"/>
+              </a:ext>
+            </a:extLst>
+          </p:cNvPr>
+          <p:cNvSpPr txBox="1">
+            <a:spLocks/>
+          </p:cNvSpPr>
+          <p:nvPr/>
+        </p:nvSpPr>
+        <p:spPr>
+          <a:xfrm>
+            <a:off x="1649282" y="2555668"/>
+            <a:ext cx="878933" cy="419787"/>
+          </a:xfrm>
+          <a:prstGeom prst="rect">
+            <a:avLst/>
+          </a:prstGeom>
+        </p:spPr>
+        <p:txBody>
+          <a:bodyPr vert="horz" lIns="0" tIns="45720" rIns="91440" bIns="45720" rtlCol="0" anchor="b">
+            <a:normAutofit/>
+          </a:bodyPr>
+          <a:lstStyle>
+            <a:lvl1pPr marL="0" indent="0" algn="l" defTabSz="914400" rtl="0" eaLnBrk="1" latinLnBrk="0" hangingPunct="1">
+              <a:lnSpc>
+                <a:spcPct val="90000"/>
+              </a:lnSpc>
+              <a:spcBef>
+                <a:spcPts val="1000"/>
+              </a:spcBef>
+              <a:buFont typeface="Arial" panose="020B0604020202020204" pitchFamily="34" charset="0"/>
+              <a:buNone/>
+              <a:defRPr sz="1600" b="1" i="0" kern="1200">
+                <a:solidFill>
+                  <a:schemeClr val="bg1"/>
+                </a:solidFill>
+                <a:latin typeface="+mj-lt"/>
+                <a:ea typeface="+mn-ea"/>
+                <a:cs typeface="Arial" panose="020B0604020202020204" pitchFamily="34" charset="0"/>
+              </a:defRPr>
+            </a:lvl1pPr>
+            <a:lvl2pPr marL="685800" indent="-228600" algn="l" defTabSz="914400" rtl="0" eaLnBrk="1" latinLnBrk="0" hangingPunct="1">
+              <a:lnSpc>
+                <a:spcPct val="90000"/>
+              </a:lnSpc>
+              <a:spcBef>
+                <a:spcPts val="500"/>
+              </a:spcBef>
+              <a:buFont typeface="Arial" panose="020B0604020202020204" pitchFamily="34" charset="0"/>
+              <a:buChar char="•"/>
+              <a:defRPr sz="1800" b="0" i="0" kern="1200">
+                <a:solidFill>
+                  <a:schemeClr val="tx2"/>
+                </a:solidFill>
+                <a:latin typeface="+mn-lt"/>
+                <a:ea typeface="+mn-ea"/>
+                <a:cs typeface="Arial" panose="020B0604020202020204" pitchFamily="34" charset="0"/>
+              </a:defRPr>
+            </a:lvl2pPr>
+            <a:lvl3pPr marL="1143000" indent="-228600" algn="l" defTabSz="914400" rtl="0" eaLnBrk="1" latinLnBrk="0" hangingPunct="1">
+              <a:lnSpc>
+                <a:spcPct val="90000"/>
+              </a:lnSpc>
+              <a:spcBef>
+                <a:spcPts val="500"/>
+              </a:spcBef>
+              <a:buFont typeface="Arial" panose="020B0604020202020204" pitchFamily="34" charset="0"/>
+              <a:buChar char="•"/>
+              <a:defRPr sz="1600" b="0" i="0" kern="1200">
+                <a:solidFill>
+                  <a:schemeClr val="tx2"/>
+                </a:solidFill>
+                <a:latin typeface="+mn-lt"/>
+                <a:ea typeface="+mn-ea"/>
+                <a:cs typeface="Arial" panose="020B0604020202020204" pitchFamily="34" charset="0"/>
+              </a:defRPr>
+            </a:lvl3pPr>
+            <a:lvl4pPr marL="1600200" indent="-228600" algn="l" defTabSz="914400" rtl="0" eaLnBrk="1" latinLnBrk="0" hangingPunct="1">
+              <a:lnSpc>
+                <a:spcPct val="90000"/>
+              </a:lnSpc>
+              <a:spcBef>
+                <a:spcPts val="500"/>
+              </a:spcBef>
+              <a:buFont typeface="Arial" panose="020B0604020202020204" pitchFamily="34" charset="0"/>
+              <a:buChar char="•"/>
+              <a:defRPr sz="1400" b="0" i="0" kern="1200">
+                <a:solidFill>
+                  <a:schemeClr val="tx2"/>
+                </a:solidFill>
+                <a:latin typeface="+mn-lt"/>
+                <a:ea typeface="+mn-ea"/>
+                <a:cs typeface="Arial" panose="020B0604020202020204" pitchFamily="34" charset="0"/>
+              </a:defRPr>
+            </a:lvl4pPr>
+            <a:lvl5pPr marL="2057400" indent="-228600" algn="l" defTabSz="914400" rtl="0" eaLnBrk="1" latinLnBrk="0" hangingPunct="1">
+              <a:lnSpc>
+                <a:spcPct val="90000"/>
+              </a:lnSpc>
+              <a:spcBef>
+                <a:spcPts val="500"/>
+              </a:spcBef>
+              <a:buFont typeface="Arial" panose="020B0604020202020204" pitchFamily="34" charset="0"/>
+              <a:buChar char="•"/>
+              <a:defRPr sz="1400" b="0" i="0" kern="1200">
+                <a:solidFill>
+                  <a:schemeClr val="tx2"/>
+                </a:solidFill>
+                <a:latin typeface="+mn-lt"/>
+                <a:ea typeface="+mn-ea"/>
+                <a:cs typeface="Arial" panose="020B0604020202020204" pitchFamily="34" charset="0"/>
+              </a:defRPr>
+            </a:lvl5pPr>
+            <a:lvl6pPr marL="2514600" indent="-228600" algn="l" defTabSz="914400" rtl="0" eaLnBrk="1" latinLnBrk="0" hangingPunct="1">
+              <a:lnSpc>
+                <a:spcPct val="90000"/>
+              </a:lnSpc>
+              <a:spcBef>
+                <a:spcPts val="500"/>
+              </a:spcBef>
+              <a:buFont typeface="Arial" panose="020B0604020202020204" pitchFamily="34" charset="0"/>
+              <a:buChar char="•"/>
+              <a:defRPr sz="1800" kern="1200">
+                <a:solidFill>
+                  <a:schemeClr val="tx1"/>
+                </a:solidFill>
+                <a:latin typeface="+mn-lt"/>
+                <a:ea typeface="+mn-ea"/>
+                <a:cs typeface="+mn-cs"/>
+              </a:defRPr>
+            </a:lvl6pPr>
+            <a:lvl7pPr marL="2971800" indent="-228600" algn="l" defTabSz="914400" rtl="0" eaLnBrk="1" latinLnBrk="0" hangingPunct="1">
+              <a:lnSpc>
+                <a:spcPct val="90000"/>
+              </a:lnSpc>
+              <a:spcBef>
+                <a:spcPts val="500"/>
+              </a:spcBef>
+              <a:buFont typeface="Arial" panose="020B0604020202020204" pitchFamily="34" charset="0"/>
+              <a:buChar char="•"/>
+              <a:defRPr sz="1800" kern="1200">
+                <a:solidFill>
+                  <a:schemeClr val="tx1"/>
+                </a:solidFill>
+                <a:latin typeface="+mn-lt"/>
+                <a:ea typeface="+mn-ea"/>
+                <a:cs typeface="+mn-cs"/>
+              </a:defRPr>
+            </a:lvl7pPr>
+            <a:lvl8pPr marL="3429000" indent="-228600" algn="l" defTabSz="914400" rtl="0" eaLnBrk="1" latinLnBrk="0" hangingPunct="1">
+              <a:lnSpc>
+                <a:spcPct val="90000"/>
+              </a:lnSpc>
+              <a:spcBef>
+                <a:spcPts val="500"/>
+              </a:spcBef>
+              <a:buFont typeface="Arial" panose="020B0604020202020204" pitchFamily="34" charset="0"/>
+              <a:buChar char="•"/>
+              <a:defRPr sz="1800" kern="1200">
+                <a:solidFill>
+                  <a:schemeClr val="tx1"/>
+                </a:solidFill>
+                <a:latin typeface="+mn-lt"/>
+                <a:ea typeface="+mn-ea"/>
+                <a:cs typeface="+mn-cs"/>
+              </a:defRPr>
+            </a:lvl8pPr>
+            <a:lvl9pPr marL="3886200" indent="-228600" algn="l" defTabSz="914400" rtl="0" eaLnBrk="1" latinLnBrk="0" hangingPunct="1">
+              <a:lnSpc>
+                <a:spcPct val="90000"/>
+              </a:lnSpc>
+              <a:spcBef>
+                <a:spcPts val="500"/>
+              </a:spcBef>
+              <a:buFont typeface="Arial" panose="020B0604020202020204" pitchFamily="34" charset="0"/>
+              <a:buChar char="•"/>
+              <a:defRPr sz="1800" kern="1200">
+                <a:solidFill>
+                  <a:schemeClr val="tx1"/>
+                </a:solidFill>
+                <a:latin typeface="+mn-lt"/>
+                <a:ea typeface="+mn-ea"/>
+                <a:cs typeface="+mn-cs"/>
+              </a:defRPr>
+            </a:lvl9pPr>
+          </a:lstStyle>
+          <a:p>
+            <a:r>
+              <a:rPr lang="en-US" dirty="0"/>
+              <a:t>Input</a:t>
+            </a:r>
+          </a:p>
+        </p:txBody>
+      </p:sp>
+      <p:pic>
+        <p:nvPicPr>
+          <p:cNvPr id="24" name="Picture 23">
+            <a:extLst>
+              <a:ext uri="{FF2B5EF4-FFF2-40B4-BE49-F238E27FC236}">
+                <a16:creationId xmlns:a16="http://schemas.microsoft.com/office/drawing/2014/main" id="{84CC60BB-3F7A-4C1B-A194-104BDD32935F}"/>
+              </a:ext>
+            </a:extLst>
+          </p:cNvPr>
+          <p:cNvPicPr>
+            <a:picLocks noChangeAspect="1"/>
+          </p:cNvPicPr>
+          <p:nvPr/>
+        </p:nvPicPr>
+        <p:blipFill>
+          <a:blip r:embed="rId3"/>
+          <a:stretch>
+            <a:fillRect/>
+          </a:stretch>
+        </p:blipFill>
+        <p:spPr>
+          <a:xfrm>
+            <a:off x="3734608" y="4506070"/>
+            <a:ext cx="768695" cy="381930"/>
+          </a:xfrm>
+          <a:prstGeom prst="rect">
+            <a:avLst/>
+          </a:prstGeom>
+        </p:spPr>
+      </p:pic>
+    </p:spTree>
+    <p:extLst>
+      <p:ext uri="{BB962C8B-B14F-4D97-AF65-F5344CB8AC3E}">
+        <p14:creationId xmlns:p14="http://schemas.microsoft.com/office/powerpoint/2010/main" val="2584108313"/>
+      </p:ext>
+    </p:extLst>
+  </p:cSld>
+  <p:clrMapOvr>
+    <a:masterClrMapping/>
+  </p:clrMapOvr>
+</p:sld>
+</file>
+
+<file path=ppt/slides/slide13.xml><?xml version="1.0" encoding="utf-8"?>
+<p:sld xmlns:a="http://schemas.openxmlformats.org/drawingml/2006/main" xmlns:r="http://schemas.openxmlformats.org/officeDocument/2006/relationships" xmlns:p="http://schemas.openxmlformats.org/presentationml/2006/main">
+  <p:cSld>
+    <p:spTree>
+      <p:nvGrpSpPr>
+        <p:cNvPr id="1" name=""/>
+        <p:cNvGrpSpPr/>
+        <p:nvPr/>
+      </p:nvGrpSpPr>
+      <p:grpSpPr>
+        <a:xfrm>
+          <a:off x="0" y="0"/>
+          <a:ext cx="0" cy="0"/>
+          <a:chOff x="0" y="0"/>
+          <a:chExt cx="0" cy="0"/>
+        </a:xfrm>
+      </p:grpSpPr>
+      <p:sp>
+        <p:nvSpPr>
+          <p:cNvPr id="7" name="Title 6">
+            <a:extLst>
+              <a:ext uri="{FF2B5EF4-FFF2-40B4-BE49-F238E27FC236}">
+                <a16:creationId xmlns:a16="http://schemas.microsoft.com/office/drawing/2014/main" id="{E55529B5-AB4C-4634-9271-E22509CF7554}"/>
+              </a:ext>
+            </a:extLst>
+          </p:cNvPr>
+          <p:cNvSpPr>
+            <a:spLocks noGrp="1"/>
+          </p:cNvSpPr>
+          <p:nvPr>
+            <p:ph type="title"/>
+          </p:nvPr>
+        </p:nvSpPr>
+        <p:spPr/>
+        <p:txBody>
+          <a:bodyPr/>
+          <a:lstStyle/>
+          <a:p>
+            <a:r>
+              <a:rPr lang="en-US" dirty="0">
+                <a:latin typeface="Times New Roman" panose="02020603050405020304" pitchFamily="18" charset="0"/>
+                <a:cs typeface="Times New Roman" panose="02020603050405020304" pitchFamily="18" charset="0"/>
+              </a:rPr>
+              <a:t>30 % Code Implement</a:t>
             </a:r>
           </a:p>
         </p:txBody>
@@ -22261,20 +22449,32 @@
           <a:bodyPr/>
           <a:lstStyle/>
           <a:p>
-            <a:r>
-              <a:rPr lang="en-US" sz="1600" dirty="0"/>
-              <a:t>	 and measuring technology which enables to measurement of their body , get right size clothes and apply body data to wearing clothes virtually  which will reduces time by having virtual trail instead of having a real trail for clothes.</a:t>
-            </a:r>
-          </a:p>
-          <a:p>
-            <a:r>
-              <a:rPr lang="en-US" sz="1600" dirty="0"/>
+            <a:pPr algn="just"/>
+            <a:r>
+              <a:rPr lang="en-US" sz="1600" dirty="0">
+                <a:latin typeface="Times New Roman" panose="02020603050405020304" pitchFamily="18" charset="0"/>
+                <a:cs typeface="Times New Roman" panose="02020603050405020304" pitchFamily="18" charset="0"/>
+              </a:rPr>
+              <a:t>We built web-base body scanning and measuring technology which enables to measurement of their body , get right size clothes and apply body data to wearing clothes virtually  which will reduces time by having virtual trail instead of having a real trail for clothes.</a:t>
+            </a:r>
+          </a:p>
+          <a:p>
+            <a:pPr algn="just"/>
+            <a:r>
+              <a:rPr lang="en-US" sz="1600" dirty="0">
+                <a:latin typeface="Times New Roman" panose="02020603050405020304" pitchFamily="18" charset="0"/>
+                <a:cs typeface="Times New Roman" panose="02020603050405020304" pitchFamily="18" charset="0"/>
+              </a:rPr>
               <a:t>The project  providing a contactless and personalized fit experience for consumers, drive down returns and inventory, and apply body data to the apparel supply chain to create a more sustainable business model to help optimize processes, cut costs, and deliver better shopping experiences </a:t>
             </a:r>
           </a:p>
           <a:p>
-            <a:r>
-              <a:rPr lang="en-US" sz="1600" dirty="0"/>
+            <a:pPr algn="just"/>
+            <a:r>
+              <a:rPr lang="en-US" sz="1600" dirty="0">
+                <a:latin typeface="Times New Roman" panose="02020603050405020304" pitchFamily="18" charset="0"/>
+                <a:cs typeface="Times New Roman" panose="02020603050405020304" pitchFamily="18" charset="0"/>
+              </a:rPr>
               <a:t>Let your customers try on clothing, style outfits and find their perfect fit . Boost conversions, reduce returns and elevate your e-commerce experience</a:t>
             </a:r>
           </a:p>
@@ -22505,6 +22705,7 @@
           </a:bodyPr>
           <a:lstStyle/>
           <a:p>
+            <a:pPr algn="just"/>
             <a:r>
               <a:rPr lang="en-US" sz="1800" dirty="0">
                 <a:solidFill>
@@ -22548,7 +22749,12 @@
             <p:ph type="body" sz="quarter" idx="16"/>
           </p:nvPr>
         </p:nvSpPr>
-        <p:spPr/>
+        <p:spPr>
+          <a:xfrm>
+            <a:off x="671945" y="3653965"/>
+            <a:ext cx="3085618" cy="2663707"/>
+          </a:xfrm>
+        </p:spPr>
         <p:txBody>
           <a:bodyPr>
             <a:normAutofit/>
@@ -22560,7 +22766,6 @@
                 <a:solidFill>
                   <a:srgbClr val="000000"/>
                 </a:solidFill>
-                <a:effectLst/>
                 <a:latin typeface="TimesNewRomanPSMT"/>
               </a:rPr>
               <a:t>More over that every user does not have device which support AR or VR technology ,which may be big reason  that thought app are still not comes to market and not know by many people .</a:t>
@@ -22574,9 +22779,8 @@
                 </a:solidFill>
                 <a:latin typeface="TimesNewRomanPSMT"/>
               </a:rPr>
-              <a:t>In additionally AR need  hardware required  like AR Kit</a:t>
-            </a:r>
-            <a:endParaRPr lang="en-US" dirty="0"/>
+              <a:t>In additionally VR need  hardware required  like VR Kit</a:t>
+            </a:r>
           </a:p>
         </p:txBody>
       </p:sp>
@@ -22653,7 +22857,7 @@
         </p:nvSpPr>
         <p:spPr>
           <a:xfrm>
-            <a:off x="4252920" y="268540"/>
+            <a:off x="4435800" y="268540"/>
             <a:ext cx="3686159" cy="1466055"/>
           </a:xfrm>
         </p:spPr>
@@ -22662,7 +22866,10 @@
           <a:lstStyle/>
           <a:p>
             <a:r>
-              <a:rPr lang="en-US" dirty="0"/>
+              <a:rPr lang="en-US" dirty="0">
+                <a:latin typeface="Times New Roman" panose="02020603050405020304" pitchFamily="18" charset="0"/>
+                <a:cs typeface="Times New Roman" panose="02020603050405020304" pitchFamily="18" charset="0"/>
+              </a:rPr>
               <a:t>Proposed System</a:t>
             </a:r>
           </a:p>
@@ -22686,83 +22893,152 @@
         </p:nvSpPr>
         <p:spPr>
           <a:xfrm>
-            <a:off x="4252921" y="1567544"/>
-            <a:ext cx="3686159" cy="4288888"/>
-          </a:xfrm>
-        </p:spPr>
-        <p:txBody>
-          <a:bodyPr/>
+            <a:off x="4344361" y="1024790"/>
+            <a:ext cx="3686159" cy="5751929"/>
+          </a:xfrm>
+        </p:spPr>
+        <p:txBody>
+          <a:bodyPr>
+            <a:normAutofit/>
+          </a:bodyPr>
           <a:lstStyle/>
           <a:p>
-            <a:r>
-              <a:rPr lang="en-US" sz="1400" dirty="0"/>
+            <a:pPr algn="just"/>
+            <a:r>
+              <a:rPr lang="en-US" sz="1400" dirty="0">
+                <a:latin typeface="Times New Roman" panose="02020603050405020304" pitchFamily="18" charset="0"/>
+                <a:cs typeface="Times New Roman" panose="02020603050405020304" pitchFamily="18" charset="0"/>
+              </a:rPr>
               <a:t>To over come the above proble</a:t>
             </a:r>
             <a:r>
-              <a:rPr lang="en-US" dirty="0"/>
+              <a:rPr lang="en-US" dirty="0">
+                <a:latin typeface="Times New Roman" panose="02020603050405020304" pitchFamily="18" charset="0"/>
+                <a:cs typeface="Times New Roman" panose="02020603050405020304" pitchFamily="18" charset="0"/>
+              </a:rPr>
               <a:t>m </a:t>
             </a:r>
             <a:r>
-              <a:rPr lang="en-US" sz="1400" dirty="0"/>
-              <a:t>We are built web-base body scanning </a:t>
-            </a:r>
-            <a:r>
-              <a:rPr lang="en-US" dirty="0"/>
+              <a:rPr lang="en-US" sz="1400" dirty="0">
+                <a:latin typeface="Times New Roman" panose="02020603050405020304" pitchFamily="18" charset="0"/>
+                <a:cs typeface="Times New Roman" panose="02020603050405020304" pitchFamily="18" charset="0"/>
+              </a:rPr>
+              <a:t>We are built web-base body scanning System </a:t>
+            </a:r>
+            <a:r>
+              <a:rPr lang="en-US" dirty="0">
+                <a:latin typeface="Times New Roman" panose="02020603050405020304" pitchFamily="18" charset="0"/>
+                <a:cs typeface="Times New Roman" panose="02020603050405020304" pitchFamily="18" charset="0"/>
+              </a:rPr>
               <a:t> </a:t>
             </a:r>
             <a:r>
-              <a:rPr lang="en-US" sz="1400" dirty="0"/>
+              <a:rPr lang="en-US" sz="1400" dirty="0">
+                <a:latin typeface="Times New Roman" panose="02020603050405020304" pitchFamily="18" charset="0"/>
+                <a:cs typeface="Times New Roman" panose="02020603050405020304" pitchFamily="18" charset="0"/>
+              </a:rPr>
               <a:t>which mean platform independent so android , </a:t>
             </a:r>
             <a:r>
-              <a:rPr lang="en-US" dirty="0"/>
-              <a:t>IOS ,Windows ,Linux ,mac every user can use it by just few clicks.</a:t>
-            </a:r>
-          </a:p>
-          <a:p>
-            <a:r>
-              <a:rPr lang="en-US" dirty="0"/>
-              <a:t>More over we create a model which have same size and color of the user to wear the cloth's  , Which will help the user to get an rough Idea How  he/she will look after they wear it.</a:t>
-            </a:r>
-          </a:p>
-        </p:txBody>
-      </p:sp>
-      <p:sp>
-        <p:nvSpPr>
-          <p:cNvPr id="3" name="Picture Placeholder 2">
-            <a:extLst>
-              <a:ext uri="{FF2B5EF4-FFF2-40B4-BE49-F238E27FC236}">
-                <a16:creationId xmlns:a16="http://schemas.microsoft.com/office/drawing/2014/main" id="{9178ABA3-85D6-461C-A487-9942B64DE68B}"/>
-              </a:ext>
-            </a:extLst>
-          </p:cNvPr>
-          <p:cNvSpPr>
-            <a:spLocks noGrp="1"/>
-          </p:cNvSpPr>
+              <a:rPr lang="en-US" dirty="0">
+                <a:latin typeface="Times New Roman" panose="02020603050405020304" pitchFamily="18" charset="0"/>
+                <a:cs typeface="Times New Roman" panose="02020603050405020304" pitchFamily="18" charset="0"/>
+              </a:rPr>
+              <a:t>IOS ,Windows ,Linux ,mac etc., user can use it by just few clicks.</a:t>
+            </a:r>
+          </a:p>
+          <a:p>
+            <a:pPr algn="just"/>
+            <a:r>
+              <a:rPr lang="en-US" dirty="0">
+                <a:latin typeface="Times New Roman" panose="02020603050405020304" pitchFamily="18" charset="0"/>
+                <a:cs typeface="Times New Roman" panose="02020603050405020304" pitchFamily="18" charset="0"/>
+              </a:rPr>
+              <a:t>More over we create a model which have same size and color of the user to wear the cloth’s virtually  , Which will help the user to get an rough Idea How  he/she will look after they wear it.</a:t>
+            </a:r>
+          </a:p>
+          <a:p>
+            <a:pPr algn="just"/>
+            <a:r>
+              <a:rPr lang="en-US" dirty="0">
+                <a:latin typeface="Times New Roman" panose="02020603050405020304" pitchFamily="18" charset="0"/>
+                <a:cs typeface="Times New Roman" panose="02020603050405020304" pitchFamily="18" charset="0"/>
+              </a:rPr>
+              <a:t>Over 37% of return can be minimize by our proposed system  which mean in e-commers business of cloth the user   was return the product due to size barrios and  the design of cloth was not suit for them .</a:t>
+            </a:r>
+          </a:p>
+          <a:p>
+            <a:pPr algn="just"/>
+            <a:r>
+              <a:rPr lang="en-US" dirty="0">
+                <a:latin typeface="Times New Roman" panose="02020603050405020304" pitchFamily="18" charset="0"/>
+                <a:cs typeface="Times New Roman" panose="02020603050405020304" pitchFamily="18" charset="0"/>
+              </a:rPr>
+              <a:t>Another benefit over the Existing System is that every time the uses should take the phot which make him uncomfortable  ,But in proposed system use store their data once and used for many time.</a:t>
+            </a:r>
+          </a:p>
+          <a:p>
+            <a:pPr algn="just"/>
+            <a:r>
+              <a:rPr lang="en-US" dirty="0">
+                <a:latin typeface="Times New Roman" panose="02020603050405020304" pitchFamily="18" charset="0"/>
+                <a:cs typeface="Times New Roman" panose="02020603050405020304" pitchFamily="18" charset="0"/>
+              </a:rPr>
+              <a:t>Due to virtual trial  the cloth are maintain hygienic , which lead to minimize the spread of infection or virus especially corona virus .</a:t>
+            </a:r>
+          </a:p>
+        </p:txBody>
+      </p:sp>
+      <p:pic>
+        <p:nvPicPr>
+          <p:cNvPr id="13" name="Picture Placeholder 12">
+            <a:extLst>
+              <a:ext uri="{FF2B5EF4-FFF2-40B4-BE49-F238E27FC236}">
+                <a16:creationId xmlns:a16="http://schemas.microsoft.com/office/drawing/2014/main" id="{1A908D56-8331-4886-98C8-62A0F50CD499}"/>
+              </a:ext>
+            </a:extLst>
+          </p:cNvPr>
+          <p:cNvPicPr>
+            <a:picLocks noGrp="1" noChangeAspect="1"/>
+          </p:cNvPicPr>
+          <p:nvPr>
+            <p:ph type="pic" sz="quarter" idx="17"/>
+          </p:nvPr>
+        </p:nvPicPr>
+        <p:blipFill>
+          <a:blip r:embed="rId2"/>
+          <a:srcRect l="36472" r="36472"/>
+          <a:stretch>
+            <a:fillRect/>
+          </a:stretch>
+        </p:blipFill>
+        <p:spPr/>
+      </p:pic>
+      <p:pic>
+        <p:nvPicPr>
+          <p:cNvPr id="19" name="Picture Placeholder 18">
+            <a:extLst>
+              <a:ext uri="{FF2B5EF4-FFF2-40B4-BE49-F238E27FC236}">
+                <a16:creationId xmlns:a16="http://schemas.microsoft.com/office/drawing/2014/main" id="{3F8F3A8D-8880-426A-A209-C16DDF63AB57}"/>
+              </a:ext>
+            </a:extLst>
+          </p:cNvPr>
+          <p:cNvPicPr>
+            <a:picLocks noGrp="1" noChangeAspect="1"/>
+          </p:cNvPicPr>
           <p:nvPr>
             <p:ph type="pic" sz="quarter" idx="16"/>
           </p:nvPr>
-        </p:nvSpPr>
+        </p:nvPicPr>
+        <p:blipFill>
+          <a:blip r:embed="rId3"/>
+          <a:srcRect l="27109" r="27109"/>
+          <a:stretch>
+            <a:fillRect/>
+          </a:stretch>
+        </p:blipFill>
         <p:spPr/>
-      </p:sp>
-      <p:sp>
-        <p:nvSpPr>
-          <p:cNvPr id="5" name="Picture Placeholder 4">
-            <a:extLst>
-              <a:ext uri="{FF2B5EF4-FFF2-40B4-BE49-F238E27FC236}">
-                <a16:creationId xmlns:a16="http://schemas.microsoft.com/office/drawing/2014/main" id="{CD039B8E-88D5-42AE-9336-804B3D8BB262}"/>
-              </a:ext>
-            </a:extLst>
-          </p:cNvPr>
-          <p:cNvSpPr>
-            <a:spLocks noGrp="1"/>
-          </p:cNvSpPr>
-          <p:nvPr>
-            <p:ph type="pic" sz="quarter" idx="17"/>
-          </p:nvPr>
-        </p:nvSpPr>
-        <p:spPr/>
-      </p:sp>
+      </p:pic>
     </p:spTree>
     <p:extLst>
       <p:ext uri="{BB962C8B-B14F-4D97-AF65-F5344CB8AC3E}">
@@ -22795,53 +23071,134 @@
       </p:grpSpPr>
       <p:pic>
         <p:nvPicPr>
-          <p:cNvPr id="7" name="Picture Placeholder 6" title="Decorative"/>
+          <p:cNvPr id="26" name="Picture 25">
+            <a:extLst>
+              <a:ext uri="{FF2B5EF4-FFF2-40B4-BE49-F238E27FC236}">
+                <a16:creationId xmlns:a16="http://schemas.microsoft.com/office/drawing/2014/main" id="{6E417A06-BAB8-4098-8B9F-63CCC42F9546}"/>
+              </a:ext>
+            </a:extLst>
+          </p:cNvPr>
           <p:cNvPicPr>
-            <a:picLocks noGrp="1" noChangeAspect="1"/>
+            <a:picLocks noChangeAspect="1"/>
           </p:cNvPicPr>
-          <p:nvPr>
-            <p:ph type="pic" sz="quarter" idx="10"/>
-          </p:nvPr>
+          <p:nvPr/>
         </p:nvPicPr>
         <p:blipFill>
-          <a:blip r:embed="rId2" cstate="email">
-            <a:extLst>
-              <a:ext uri="{28A0092B-C50C-407E-A947-70E740481C1C}">
-                <a14:useLocalDpi xmlns:a14="http://schemas.microsoft.com/office/drawing/2010/main"/>
-              </a:ext>
-            </a:extLst>
-          </a:blip>
-          <a:srcRect/>
+          <a:blip r:embed="rId2"/>
           <a:stretch>
             <a:fillRect/>
           </a:stretch>
         </p:blipFill>
         <p:spPr>
-          <a:xfrm flipH="1">
+          <a:xfrm>
+            <a:off x="2265680" y="554006"/>
+            <a:ext cx="8437880" cy="6333374"/>
+          </a:xfrm>
+          <a:prstGeom prst="rect">
+            <a:avLst/>
+          </a:prstGeom>
+        </p:spPr>
+      </p:pic>
+      <p:sp>
+        <p:nvSpPr>
+          <p:cNvPr id="27" name="Rectangle 26">
+            <a:extLst>
+              <a:ext uri="{FF2B5EF4-FFF2-40B4-BE49-F238E27FC236}">
+                <a16:creationId xmlns:a16="http://schemas.microsoft.com/office/drawing/2014/main" id="{2746EA31-697C-4DAF-A4D8-9B2C72B59B9E}"/>
+              </a:ext>
+            </a:extLst>
+          </p:cNvPr>
+          <p:cNvSpPr/>
+          <p:nvPr/>
+        </p:nvSpPr>
+        <p:spPr>
+          <a:xfrm>
             <a:off x="0" y="0"/>
-            <a:ext cx="12192000" cy="6858000"/>
-          </a:xfrm>
-        </p:spPr>
-      </p:pic>
-      <p:sp>
-        <p:nvSpPr>
-          <p:cNvPr id="3" name="Text Placeholder 2"/>
-          <p:cNvSpPr>
-            <a:spLocks noGrp="1"/>
-          </p:cNvSpPr>
-          <p:nvPr>
-            <p:ph type="body" sz="quarter" idx="14"/>
-          </p:nvPr>
-        </p:nvSpPr>
-        <p:spPr/>
-        <p:txBody>
-          <a:bodyPr/>
+            <a:ext cx="8950960" cy="965200"/>
+          </a:xfrm>
+          <a:prstGeom prst="rect">
+            <a:avLst/>
+          </a:prstGeom>
+        </p:spPr>
+        <p:style>
+          <a:lnRef idx="2">
+            <a:schemeClr val="accent2">
+              <a:shade val="50000"/>
+            </a:schemeClr>
+          </a:lnRef>
+          <a:fillRef idx="1">
+            <a:schemeClr val="accent2"/>
+          </a:fillRef>
+          <a:effectRef idx="0">
+            <a:schemeClr val="accent2"/>
+          </a:effectRef>
+          <a:fontRef idx="minor">
+            <a:schemeClr val="lt1"/>
+          </a:fontRef>
+        </p:style>
+        <p:txBody>
+          <a:bodyPr rtlCol="0" anchor="ctr"/>
           <a:lstStyle/>
           <a:p>
-            <a:r>
-              <a:rPr lang="en-US" dirty="0"/>
+            <a:pPr algn="ctr"/>
+            <a:endParaRPr lang="en-US"/>
+          </a:p>
+        </p:txBody>
+      </p:sp>
+      <p:sp>
+        <p:nvSpPr>
+          <p:cNvPr id="18" name="Title 17">
+            <a:extLst>
+              <a:ext uri="{FF2B5EF4-FFF2-40B4-BE49-F238E27FC236}">
+                <a16:creationId xmlns:a16="http://schemas.microsoft.com/office/drawing/2014/main" id="{F61A19A2-3F12-41C7-AC41-A967FE54DC87}"/>
+              </a:ext>
+            </a:extLst>
+          </p:cNvPr>
+          <p:cNvSpPr>
+            <a:spLocks noGrp="1"/>
+          </p:cNvSpPr>
+          <p:nvPr>
+            <p:ph type="title" idx="4294967295"/>
+          </p:nvPr>
+        </p:nvSpPr>
+        <p:spPr>
+          <a:xfrm>
+            <a:off x="0" y="462598"/>
+            <a:ext cx="8716963" cy="822325"/>
+          </a:xfrm>
+        </p:spPr>
+        <p:txBody>
+          <a:bodyPr>
+            <a:normAutofit fontScale="90000"/>
+          </a:bodyPr>
+          <a:lstStyle/>
+          <a:p>
+            <a:r>
+              <a:rPr lang="en-US" dirty="0">
+                <a:solidFill>
+                  <a:schemeClr val="bg1"/>
+                </a:solidFill>
+                <a:latin typeface="Times New Roman" panose="02020603050405020304" pitchFamily="18" charset="0"/>
+                <a:cs typeface="Times New Roman" panose="02020603050405020304" pitchFamily="18" charset="0"/>
+              </a:rPr>
               <a:t>Architectural Design for Proposed System</a:t>
             </a:r>
+            <a:br>
+              <a:rPr lang="en-US" dirty="0">
+                <a:solidFill>
+                  <a:schemeClr val="bg1"/>
+                </a:solidFill>
+                <a:latin typeface="Times New Roman" panose="02020603050405020304" pitchFamily="18" charset="0"/>
+                <a:cs typeface="Times New Roman" panose="02020603050405020304" pitchFamily="18" charset="0"/>
+              </a:rPr>
+            </a:br>
+            <a:endParaRPr lang="en-US" dirty="0">
+              <a:solidFill>
+                <a:schemeClr val="bg1"/>
+              </a:solidFill>
+              <a:latin typeface="Times New Roman" panose="02020603050405020304" pitchFamily="18" charset="0"/>
+              <a:cs typeface="Times New Roman" panose="02020603050405020304" pitchFamily="18" charset="0"/>
+            </a:endParaRPr>
           </a:p>
         </p:txBody>
       </p:sp>
@@ -22875,6 +23232,276 @@
           <a:chExt cx="0" cy="0"/>
         </a:xfrm>
       </p:grpSpPr>
+      <p:pic>
+        <p:nvPicPr>
+          <p:cNvPr id="23" name="Picture Placeholder 22">
+            <a:extLst>
+              <a:ext uri="{FF2B5EF4-FFF2-40B4-BE49-F238E27FC236}">
+                <a16:creationId xmlns:a16="http://schemas.microsoft.com/office/drawing/2014/main" id="{476CB8EF-4559-4781-A2B4-10E3421AB8C0}"/>
+              </a:ext>
+            </a:extLst>
+          </p:cNvPr>
+          <p:cNvPicPr>
+            <a:picLocks noGrp="1" noChangeAspect="1"/>
+          </p:cNvPicPr>
+          <p:nvPr>
+            <p:ph type="pic" sz="quarter" idx="12"/>
+          </p:nvPr>
+        </p:nvPicPr>
+        <p:blipFill>
+          <a:blip r:embed="rId2"/>
+          <a:srcRect l="14201" r="14201"/>
+          <a:stretch>
+            <a:fillRect/>
+          </a:stretch>
+        </p:blipFill>
+        <p:spPr>
+          <a:xfrm>
+            <a:off x="0" y="-101600"/>
+            <a:ext cx="4910666" cy="6858000"/>
+          </a:xfrm>
+        </p:spPr>
+      </p:pic>
+      <p:sp>
+        <p:nvSpPr>
+          <p:cNvPr id="6" name="Text Placeholder 5">
+            <a:extLst>
+              <a:ext uri="{FF2B5EF4-FFF2-40B4-BE49-F238E27FC236}">
+                <a16:creationId xmlns:a16="http://schemas.microsoft.com/office/drawing/2014/main" id="{95171B7B-32DF-4D1D-818C-59A5434EEA89}"/>
+              </a:ext>
+            </a:extLst>
+          </p:cNvPr>
+          <p:cNvSpPr>
+            <a:spLocks noGrp="1"/>
+          </p:cNvSpPr>
+          <p:nvPr>
+            <p:ph type="body" sz="quarter" idx="13"/>
+          </p:nvPr>
+        </p:nvSpPr>
+        <p:spPr>
+          <a:xfrm>
+            <a:off x="6295131" y="2571750"/>
+            <a:ext cx="4801847" cy="755650"/>
+          </a:xfrm>
+        </p:spPr>
+        <p:txBody>
+          <a:bodyPr/>
+          <a:lstStyle/>
+          <a:p>
+            <a:r>
+              <a:rPr lang="en-US" dirty="0">
+                <a:latin typeface="Times New Roman" panose="02020603050405020304" pitchFamily="18" charset="0"/>
+                <a:cs typeface="Times New Roman" panose="02020603050405020304" pitchFamily="18" charset="0"/>
+              </a:rPr>
+              <a:t>Gather Measurement ( Manually , RCM [Scanning])</a:t>
+            </a:r>
+          </a:p>
+        </p:txBody>
+      </p:sp>
+      <p:sp>
+        <p:nvSpPr>
+          <p:cNvPr id="7" name="Text Placeholder 6">
+            <a:extLst>
+              <a:ext uri="{FF2B5EF4-FFF2-40B4-BE49-F238E27FC236}">
+                <a16:creationId xmlns:a16="http://schemas.microsoft.com/office/drawing/2014/main" id="{846A3069-8AAE-4455-BD11-BDCD51B13E95}"/>
+              </a:ext>
+            </a:extLst>
+          </p:cNvPr>
+          <p:cNvSpPr>
+            <a:spLocks noGrp="1"/>
+          </p:cNvSpPr>
+          <p:nvPr>
+            <p:ph type="body" sz="quarter" idx="14"/>
+          </p:nvPr>
+        </p:nvSpPr>
+        <p:spPr>
+          <a:xfrm>
+            <a:off x="6366845" y="3951765"/>
+            <a:ext cx="4801847" cy="755650"/>
+          </a:xfrm>
+        </p:spPr>
+        <p:txBody>
+          <a:bodyPr/>
+          <a:lstStyle/>
+          <a:p>
+            <a:r>
+              <a:rPr lang="en-US" dirty="0">
+                <a:latin typeface="Times New Roman" panose="02020603050405020304" pitchFamily="18" charset="0"/>
+                <a:cs typeface="Times New Roman" panose="02020603050405020304" pitchFamily="18" charset="0"/>
+              </a:rPr>
+              <a:t>Create Model (Human ,Product)</a:t>
+            </a:r>
+          </a:p>
+        </p:txBody>
+      </p:sp>
+      <p:sp>
+        <p:nvSpPr>
+          <p:cNvPr id="8" name="Text Placeholder 7">
+            <a:extLst>
+              <a:ext uri="{FF2B5EF4-FFF2-40B4-BE49-F238E27FC236}">
+                <a16:creationId xmlns:a16="http://schemas.microsoft.com/office/drawing/2014/main" id="{4CAC8332-7A51-45A8-8927-4EEEEFA1956B}"/>
+              </a:ext>
+            </a:extLst>
+          </p:cNvPr>
+          <p:cNvSpPr>
+            <a:spLocks noGrp="1"/>
+          </p:cNvSpPr>
+          <p:nvPr>
+            <p:ph type="body" sz="quarter" idx="15"/>
+          </p:nvPr>
+        </p:nvSpPr>
+        <p:spPr>
+          <a:xfrm>
+            <a:off x="6366846" y="5368885"/>
+            <a:ext cx="4801847" cy="755650"/>
+          </a:xfrm>
+        </p:spPr>
+        <p:txBody>
+          <a:bodyPr/>
+          <a:lstStyle/>
+          <a:p>
+            <a:r>
+              <a:rPr lang="en-US" dirty="0">
+                <a:latin typeface="Times New Roman" panose="02020603050405020304" pitchFamily="18" charset="0"/>
+                <a:cs typeface="Times New Roman" panose="02020603050405020304" pitchFamily="18" charset="0"/>
+              </a:rPr>
+              <a:t>Virtual trial</a:t>
+            </a:r>
+          </a:p>
+        </p:txBody>
+      </p:sp>
+      <p:sp>
+        <p:nvSpPr>
+          <p:cNvPr id="10" name="Text Placeholder 9">
+            <a:extLst>
+              <a:ext uri="{FF2B5EF4-FFF2-40B4-BE49-F238E27FC236}">
+                <a16:creationId xmlns:a16="http://schemas.microsoft.com/office/drawing/2014/main" id="{85D73E84-4790-4CA1-9311-C30C4C22541F}"/>
+              </a:ext>
+            </a:extLst>
+          </p:cNvPr>
+          <p:cNvSpPr>
+            <a:spLocks noGrp="1"/>
+          </p:cNvSpPr>
+          <p:nvPr>
+            <p:ph type="body" sz="quarter" idx="17"/>
+          </p:nvPr>
+        </p:nvSpPr>
+        <p:spPr>
+          <a:xfrm>
+            <a:off x="5098304" y="1326590"/>
+            <a:ext cx="798566" cy="755650"/>
+          </a:xfrm>
+        </p:spPr>
+        <p:txBody>
+          <a:bodyPr/>
+          <a:lstStyle/>
+          <a:p>
+            <a:r>
+              <a:rPr lang="en-US" dirty="0"/>
+              <a:t>1</a:t>
+            </a:r>
+          </a:p>
+        </p:txBody>
+      </p:sp>
+      <p:sp>
+        <p:nvSpPr>
+          <p:cNvPr id="11" name="Text Placeholder 10">
+            <a:extLst>
+              <a:ext uri="{FF2B5EF4-FFF2-40B4-BE49-F238E27FC236}">
+                <a16:creationId xmlns:a16="http://schemas.microsoft.com/office/drawing/2014/main" id="{A4D3631A-1B16-42E2-8568-CC31365E7635}"/>
+              </a:ext>
+            </a:extLst>
+          </p:cNvPr>
+          <p:cNvSpPr>
+            <a:spLocks noGrp="1"/>
+          </p:cNvSpPr>
+          <p:nvPr>
+            <p:ph type="body" sz="quarter" idx="18"/>
+          </p:nvPr>
+        </p:nvSpPr>
+        <p:spPr>
+          <a:xfrm>
+            <a:off x="5098304" y="2571750"/>
+            <a:ext cx="798566" cy="755650"/>
+          </a:xfrm>
+        </p:spPr>
+        <p:txBody>
+          <a:bodyPr/>
+          <a:lstStyle/>
+          <a:p>
+            <a:r>
+              <a:rPr lang="en-US" dirty="0"/>
+              <a:t>2</a:t>
+            </a:r>
+          </a:p>
+        </p:txBody>
+      </p:sp>
+      <p:sp>
+        <p:nvSpPr>
+          <p:cNvPr id="12" name="Text Placeholder 11">
+            <a:extLst>
+              <a:ext uri="{FF2B5EF4-FFF2-40B4-BE49-F238E27FC236}">
+                <a16:creationId xmlns:a16="http://schemas.microsoft.com/office/drawing/2014/main" id="{CC8C2F10-FFF9-4C78-BDC3-6DC3E528850E}"/>
+              </a:ext>
+            </a:extLst>
+          </p:cNvPr>
+          <p:cNvSpPr>
+            <a:spLocks noGrp="1"/>
+          </p:cNvSpPr>
+          <p:nvPr>
+            <p:ph type="body" sz="quarter" idx="19"/>
+          </p:nvPr>
+        </p:nvSpPr>
+        <p:spPr>
+          <a:xfrm>
+            <a:off x="5084074" y="3977480"/>
+            <a:ext cx="798566" cy="755650"/>
+          </a:xfrm>
+        </p:spPr>
+        <p:txBody>
+          <a:bodyPr/>
+          <a:lstStyle/>
+          <a:p>
+            <a:r>
+              <a:rPr lang="en-US" dirty="0"/>
+              <a:t>3</a:t>
+            </a:r>
+          </a:p>
+        </p:txBody>
+      </p:sp>
+      <p:sp>
+        <p:nvSpPr>
+          <p:cNvPr id="13" name="Text Placeholder 12">
+            <a:extLst>
+              <a:ext uri="{FF2B5EF4-FFF2-40B4-BE49-F238E27FC236}">
+                <a16:creationId xmlns:a16="http://schemas.microsoft.com/office/drawing/2014/main" id="{324B5900-9262-4EB2-ACAB-91A40A2B7A47}"/>
+              </a:ext>
+            </a:extLst>
+          </p:cNvPr>
+          <p:cNvSpPr>
+            <a:spLocks noGrp="1"/>
+          </p:cNvSpPr>
+          <p:nvPr>
+            <p:ph type="body" sz="quarter" idx="20"/>
+          </p:nvPr>
+        </p:nvSpPr>
+        <p:spPr>
+          <a:xfrm>
+            <a:off x="5072609" y="5222640"/>
+            <a:ext cx="798566" cy="755650"/>
+          </a:xfrm>
+        </p:spPr>
+        <p:txBody>
+          <a:bodyPr/>
+          <a:lstStyle/>
+          <a:p>
+            <a:r>
+              <a:rPr lang="en-US" dirty="0"/>
+              <a:t>4</a:t>
+            </a:r>
+          </a:p>
+        </p:txBody>
+      </p:sp>
       <p:sp>
         <p:nvSpPr>
           <p:cNvPr id="4" name="Title 3">
@@ -22891,44 +23518,226 @@
             <p:ph type="title"/>
           </p:nvPr>
         </p:nvSpPr>
-        <p:spPr/>
+        <p:spPr>
+          <a:xfrm>
+            <a:off x="6542134" y="-146165"/>
+            <a:ext cx="4307840" cy="1248876"/>
+          </a:xfrm>
+        </p:spPr>
         <p:txBody>
           <a:bodyPr>
+            <a:normAutofit fontScale="90000"/>
+          </a:bodyPr>
+          <a:lstStyle/>
+          <a:p>
+            <a:r>
+              <a:rPr lang="en-US" dirty="0">
+                <a:latin typeface="Times New Roman" panose="02020603050405020304" pitchFamily="18" charset="0"/>
+                <a:cs typeface="Times New Roman" panose="02020603050405020304" pitchFamily="18" charset="0"/>
+              </a:rPr>
+              <a:t>Modules  Split-Up </a:t>
+            </a:r>
+          </a:p>
+        </p:txBody>
+      </p:sp>
+      <p:sp>
+        <p:nvSpPr>
+          <p:cNvPr id="15" name="Text Placeholder 5">
+            <a:extLst>
+              <a:ext uri="{FF2B5EF4-FFF2-40B4-BE49-F238E27FC236}">
+                <a16:creationId xmlns:a16="http://schemas.microsoft.com/office/drawing/2014/main" id="{EFBD374C-BD18-4172-80CC-4771DC26B02B}"/>
+              </a:ext>
+            </a:extLst>
+          </p:cNvPr>
+          <p:cNvSpPr txBox="1">
+            <a:spLocks/>
+          </p:cNvSpPr>
+          <p:nvPr/>
+        </p:nvSpPr>
+        <p:spPr>
+          <a:xfrm>
+            <a:off x="6366846" y="1384220"/>
+            <a:ext cx="4801847" cy="755650"/>
+          </a:xfrm>
+          <a:prstGeom prst="rect">
+            <a:avLst/>
+          </a:prstGeom>
+        </p:spPr>
+        <p:txBody>
+          <a:bodyPr vert="horz" lIns="91440" tIns="45720" rIns="91440" bIns="45720" rtlCol="0" anchor="ctr">
             <a:normAutofit/>
           </a:bodyPr>
-          <a:lstStyle/>
-          <a:p>
-            <a:r>
-              <a:rPr lang="en-US" dirty="0"/>
-              <a:t>Modules  Split-Up </a:t>
-            </a:r>
-          </a:p>
-        </p:txBody>
-      </p:sp>
-      <p:sp>
-        <p:nvSpPr>
-          <p:cNvPr id="5" name="Text Placeholder 4">
-            <a:extLst>
-              <a:ext uri="{FF2B5EF4-FFF2-40B4-BE49-F238E27FC236}">
-                <a16:creationId xmlns:a16="http://schemas.microsoft.com/office/drawing/2014/main" id="{DBE20D5C-43B3-4BCF-8700-BD30912F7568}"/>
-              </a:ext>
-            </a:extLst>
-          </p:cNvPr>
-          <p:cNvSpPr>
-            <a:spLocks noGrp="1"/>
-          </p:cNvSpPr>
-          <p:nvPr>
-            <p:ph type="body" sz="quarter" idx="10"/>
-          </p:nvPr>
-        </p:nvSpPr>
-        <p:spPr/>
-        <p:txBody>
-          <a:bodyPr/>
-          <a:lstStyle/>
-          <a:p>
-            <a:r>
-              <a:rPr lang="en-US" dirty="0"/>
-              <a:t>1</a:t>
+          <a:lstStyle>
+            <a:lvl1pPr marL="0" indent="0" algn="l" defTabSz="914400" rtl="0" eaLnBrk="1" latinLnBrk="0" hangingPunct="1">
+              <a:lnSpc>
+                <a:spcPct val="90000"/>
+              </a:lnSpc>
+              <a:spcBef>
+                <a:spcPts val="0"/>
+              </a:spcBef>
+              <a:buFont typeface="Arial" panose="020B0604020202020204" pitchFamily="34" charset="0"/>
+              <a:buNone/>
+              <a:defRPr sz="1600" b="0" i="0" kern="1200">
+                <a:solidFill>
+                  <a:schemeClr val="tx2"/>
+                </a:solidFill>
+                <a:latin typeface="+mn-lt"/>
+                <a:ea typeface="+mn-ea"/>
+                <a:cs typeface="Arial" panose="020B0604020202020204" pitchFamily="34" charset="0"/>
+              </a:defRPr>
+            </a:lvl1pPr>
+            <a:lvl2pPr marL="457200" indent="0" algn="l" defTabSz="914400" rtl="0" eaLnBrk="1" latinLnBrk="0" hangingPunct="1">
+              <a:lnSpc>
+                <a:spcPct val="90000"/>
+              </a:lnSpc>
+              <a:spcBef>
+                <a:spcPts val="500"/>
+              </a:spcBef>
+              <a:buFont typeface="Arial" panose="020B0604020202020204" pitchFamily="34" charset="0"/>
+              <a:buNone/>
+              <a:defRPr sz="1800" b="0" i="0" kern="1200">
+                <a:solidFill>
+                  <a:schemeClr val="tx2"/>
+                </a:solidFill>
+                <a:latin typeface="+mn-lt"/>
+                <a:ea typeface="+mn-ea"/>
+                <a:cs typeface="Arial" panose="020B0604020202020204" pitchFamily="34" charset="0"/>
+              </a:defRPr>
+            </a:lvl2pPr>
+            <a:lvl3pPr marL="1143000" indent="-228600" algn="l" defTabSz="914400" rtl="0" eaLnBrk="1" latinLnBrk="0" hangingPunct="1">
+              <a:lnSpc>
+                <a:spcPct val="90000"/>
+              </a:lnSpc>
+              <a:spcBef>
+                <a:spcPts val="500"/>
+              </a:spcBef>
+              <a:buFont typeface="Arial" panose="020B0604020202020204" pitchFamily="34" charset="0"/>
+              <a:buChar char="•"/>
+              <a:defRPr sz="1600" b="0" i="0" kern="1200">
+                <a:solidFill>
+                  <a:schemeClr val="tx2"/>
+                </a:solidFill>
+                <a:latin typeface="+mn-lt"/>
+                <a:ea typeface="+mn-ea"/>
+                <a:cs typeface="Arial" panose="020B0604020202020204" pitchFamily="34" charset="0"/>
+              </a:defRPr>
+            </a:lvl3pPr>
+            <a:lvl4pPr marL="1600200" indent="-228600" algn="l" defTabSz="914400" rtl="0" eaLnBrk="1" latinLnBrk="0" hangingPunct="1">
+              <a:lnSpc>
+                <a:spcPct val="90000"/>
+              </a:lnSpc>
+              <a:spcBef>
+                <a:spcPts val="500"/>
+              </a:spcBef>
+              <a:buFont typeface="Arial" panose="020B0604020202020204" pitchFamily="34" charset="0"/>
+              <a:buChar char="•"/>
+              <a:defRPr sz="1400" b="0" i="0" kern="1200">
+                <a:solidFill>
+                  <a:schemeClr val="tx2"/>
+                </a:solidFill>
+                <a:latin typeface="+mn-lt"/>
+                <a:ea typeface="+mn-ea"/>
+                <a:cs typeface="Arial" panose="020B0604020202020204" pitchFamily="34" charset="0"/>
+              </a:defRPr>
+            </a:lvl4pPr>
+            <a:lvl5pPr marL="2057400" indent="-228600" algn="l" defTabSz="914400" rtl="0" eaLnBrk="1" latinLnBrk="0" hangingPunct="1">
+              <a:lnSpc>
+                <a:spcPct val="90000"/>
+              </a:lnSpc>
+              <a:spcBef>
+                <a:spcPts val="500"/>
+              </a:spcBef>
+              <a:buFont typeface="Arial" panose="020B0604020202020204" pitchFamily="34" charset="0"/>
+              <a:buChar char="•"/>
+              <a:defRPr sz="1400" b="0" i="0" kern="1200">
+                <a:solidFill>
+                  <a:schemeClr val="tx2"/>
+                </a:solidFill>
+                <a:latin typeface="+mn-lt"/>
+                <a:ea typeface="+mn-ea"/>
+                <a:cs typeface="Arial" panose="020B0604020202020204" pitchFamily="34" charset="0"/>
+              </a:defRPr>
+            </a:lvl5pPr>
+            <a:lvl6pPr marL="2514600" indent="-228600" algn="l" defTabSz="914400" rtl="0" eaLnBrk="1" latinLnBrk="0" hangingPunct="1">
+              <a:lnSpc>
+                <a:spcPct val="90000"/>
+              </a:lnSpc>
+              <a:spcBef>
+                <a:spcPts val="500"/>
+              </a:spcBef>
+              <a:buFont typeface="Arial" panose="020B0604020202020204" pitchFamily="34" charset="0"/>
+              <a:buChar char="•"/>
+              <a:defRPr sz="1800" kern="1200">
+                <a:solidFill>
+                  <a:schemeClr val="tx1"/>
+                </a:solidFill>
+                <a:latin typeface="+mn-lt"/>
+                <a:ea typeface="+mn-ea"/>
+                <a:cs typeface="+mn-cs"/>
+              </a:defRPr>
+            </a:lvl6pPr>
+            <a:lvl7pPr marL="2971800" indent="-228600" algn="l" defTabSz="914400" rtl="0" eaLnBrk="1" latinLnBrk="0" hangingPunct="1">
+              <a:lnSpc>
+                <a:spcPct val="90000"/>
+              </a:lnSpc>
+              <a:spcBef>
+                <a:spcPts val="500"/>
+              </a:spcBef>
+              <a:buFont typeface="Arial" panose="020B0604020202020204" pitchFamily="34" charset="0"/>
+              <a:buChar char="•"/>
+              <a:defRPr sz="1800" kern="1200">
+                <a:solidFill>
+                  <a:schemeClr val="tx1"/>
+                </a:solidFill>
+                <a:latin typeface="+mn-lt"/>
+                <a:ea typeface="+mn-ea"/>
+                <a:cs typeface="+mn-cs"/>
+              </a:defRPr>
+            </a:lvl7pPr>
+            <a:lvl8pPr marL="3429000" indent="-228600" algn="l" defTabSz="914400" rtl="0" eaLnBrk="1" latinLnBrk="0" hangingPunct="1">
+              <a:lnSpc>
+                <a:spcPct val="90000"/>
+              </a:lnSpc>
+              <a:spcBef>
+                <a:spcPts val="500"/>
+              </a:spcBef>
+              <a:buFont typeface="Arial" panose="020B0604020202020204" pitchFamily="34" charset="0"/>
+              <a:buChar char="•"/>
+              <a:defRPr sz="1800" kern="1200">
+                <a:solidFill>
+                  <a:schemeClr val="tx1"/>
+                </a:solidFill>
+                <a:latin typeface="+mn-lt"/>
+                <a:ea typeface="+mn-ea"/>
+                <a:cs typeface="+mn-cs"/>
+              </a:defRPr>
+            </a:lvl8pPr>
+            <a:lvl9pPr marL="3886200" indent="-228600" algn="l" defTabSz="914400" rtl="0" eaLnBrk="1" latinLnBrk="0" hangingPunct="1">
+              <a:lnSpc>
+                <a:spcPct val="90000"/>
+              </a:lnSpc>
+              <a:spcBef>
+                <a:spcPts val="500"/>
+              </a:spcBef>
+              <a:buFont typeface="Arial" panose="020B0604020202020204" pitchFamily="34" charset="0"/>
+              <a:buChar char="•"/>
+              <a:defRPr sz="1800" kern="1200">
+                <a:solidFill>
+                  <a:schemeClr val="tx1"/>
+                </a:solidFill>
+                <a:latin typeface="+mn-lt"/>
+                <a:ea typeface="+mn-ea"/>
+                <a:cs typeface="+mn-cs"/>
+              </a:defRPr>
+            </a:lvl9pPr>
+          </a:lstStyle>
+          <a:p>
+            <a:r>
+              <a:rPr lang="en-US" dirty="0">
+                <a:latin typeface="Times New Roman" panose="02020603050405020304" pitchFamily="18" charset="0"/>
+                <a:cs typeface="Times New Roman" panose="02020603050405020304" pitchFamily="18" charset="0"/>
+              </a:rPr>
+              <a:t>Login</a:t>
             </a:r>
           </a:p>
         </p:txBody>
@@ -22965,41 +23774,6 @@
       </p:grpSpPr>
       <p:sp>
         <p:nvSpPr>
-          <p:cNvPr id="7" name="Text Placeholder 6">
-            <a:extLst>
-              <a:ext uri="{FF2B5EF4-FFF2-40B4-BE49-F238E27FC236}">
-                <a16:creationId xmlns:a16="http://schemas.microsoft.com/office/drawing/2014/main" id="{87FCC6D1-213C-4A86-A2D0-742E15438C09}"/>
-              </a:ext>
-            </a:extLst>
-          </p:cNvPr>
-          <p:cNvSpPr>
-            <a:spLocks noGrp="1"/>
-          </p:cNvSpPr>
-          <p:nvPr>
-            <p:ph type="body" sz="quarter" idx="17"/>
-          </p:nvPr>
-        </p:nvSpPr>
-        <p:spPr/>
-        <p:txBody>
-          <a:bodyPr/>
-          <a:lstStyle/>
-          <a:p>
-            <a:r>
-              <a:rPr lang="en-US" dirty="0"/>
-              <a:t>Lorem ipsum dolor sit amet, consectetur adipiscing elit. Phasellus auctor efficitur </a:t>
-            </a:r>
-            <a:br>
-              <a:rPr lang="en-US" dirty="0"/>
-            </a:br>
-            <a:r>
-              <a:rPr lang="en-US" dirty="0"/>
-              <a:t>duiet facilisis. </a:t>
-            </a:r>
-          </a:p>
-        </p:txBody>
-      </p:sp>
-      <p:sp>
-        <p:nvSpPr>
           <p:cNvPr id="20" name="Text Placeholder 19">
             <a:extLst>
               <a:ext uri="{FF2B5EF4-FFF2-40B4-BE49-F238E27FC236}">
@@ -23014,167 +23788,109 @@
             <p:ph type="body" sz="quarter" idx="18"/>
           </p:nvPr>
         </p:nvSpPr>
-        <p:spPr/>
-        <p:txBody>
-          <a:bodyPr/>
-          <a:lstStyle/>
-          <a:p>
-            <a:r>
-              <a:rPr lang="en-US" dirty="0"/>
-              <a:t>Lorem ipsum dolor sit amet, consectetur adipiscing elit. Phasellus auctor efficitur </a:t>
-            </a:r>
-            <a:br>
-              <a:rPr lang="en-US" dirty="0"/>
-            </a:br>
-            <a:r>
-              <a:rPr lang="en-US" dirty="0"/>
-              <a:t>duiet facilisis. </a:t>
-            </a:r>
-          </a:p>
-        </p:txBody>
-      </p:sp>
-      <p:sp>
-        <p:nvSpPr>
-          <p:cNvPr id="21" name="Text Placeholder 20">
-            <a:extLst>
-              <a:ext uri="{FF2B5EF4-FFF2-40B4-BE49-F238E27FC236}">
-                <a16:creationId xmlns:a16="http://schemas.microsoft.com/office/drawing/2014/main" id="{E4D7EF6E-37B1-4694-B769-3DDEC29D8381}"/>
-              </a:ext>
-            </a:extLst>
-          </p:cNvPr>
-          <p:cNvSpPr>
-            <a:spLocks noGrp="1"/>
-          </p:cNvSpPr>
-          <p:nvPr>
-            <p:ph type="body" sz="quarter" idx="19"/>
-          </p:nvPr>
-        </p:nvSpPr>
-        <p:spPr/>
-        <p:txBody>
-          <a:bodyPr/>
-          <a:lstStyle/>
-          <a:p>
-            <a:r>
-              <a:rPr lang="en-US" dirty="0"/>
-              <a:t>Lorem ipsum dolor sit amet, consectetur adipiscing elit. Phasellus auctor efficitur </a:t>
-            </a:r>
-            <a:br>
-              <a:rPr lang="en-US" dirty="0"/>
-            </a:br>
-            <a:r>
-              <a:rPr lang="en-US" dirty="0"/>
-              <a:t>duiet facilisis. </a:t>
-            </a:r>
-          </a:p>
-        </p:txBody>
-      </p:sp>
-      <p:sp>
-        <p:nvSpPr>
-          <p:cNvPr id="22" name="Text Placeholder 21">
-            <a:extLst>
-              <a:ext uri="{FF2B5EF4-FFF2-40B4-BE49-F238E27FC236}">
-                <a16:creationId xmlns:a16="http://schemas.microsoft.com/office/drawing/2014/main" id="{ABF89FBA-20AC-4FD7-833B-ADA0EEFFCADC}"/>
-              </a:ext>
-            </a:extLst>
-          </p:cNvPr>
-          <p:cNvSpPr>
-            <a:spLocks noGrp="1"/>
-          </p:cNvSpPr>
-          <p:nvPr>
-            <p:ph type="body" sz="quarter" idx="20"/>
-          </p:nvPr>
-        </p:nvSpPr>
-        <p:spPr/>
-        <p:txBody>
-          <a:bodyPr/>
-          <a:lstStyle/>
-          <a:p>
-            <a:r>
-              <a:rPr lang="en-US" dirty="0"/>
-              <a:t>Lorem ipsum dolor sit amet, consectetur adipiscing elit. Phasellus auctor efficitur </a:t>
-            </a:r>
-            <a:br>
-              <a:rPr lang="en-US" dirty="0"/>
-            </a:br>
-            <a:r>
-              <a:rPr lang="en-US" dirty="0"/>
-              <a:t>duiet facilisis. </a:t>
-            </a:r>
-          </a:p>
-        </p:txBody>
-      </p:sp>
-      <p:sp>
-        <p:nvSpPr>
-          <p:cNvPr id="5" name="Title 4">
-            <a:extLst>
-              <a:ext uri="{FF2B5EF4-FFF2-40B4-BE49-F238E27FC236}">
-                <a16:creationId xmlns:a16="http://schemas.microsoft.com/office/drawing/2014/main" id="{96DBE169-BA91-4B17-9AF2-4BAD528BEE06}"/>
-              </a:ext>
-            </a:extLst>
-          </p:cNvPr>
-          <p:cNvSpPr>
-            <a:spLocks noGrp="1"/>
-          </p:cNvSpPr>
-          <p:nvPr>
-            <p:ph type="title"/>
-          </p:nvPr>
-        </p:nvSpPr>
-        <p:spPr/>
-        <p:txBody>
-          <a:bodyPr/>
-          <a:lstStyle/>
-          <a:p>
-            <a:r>
-              <a:rPr lang="en-US" dirty="0"/>
-              <a:t>Algorithms</a:t>
-            </a:r>
-          </a:p>
-        </p:txBody>
-      </p:sp>
-      <p:sp>
-        <p:nvSpPr>
-          <p:cNvPr id="66" name="Text Placeholder 65">
-            <a:extLst>
-              <a:ext uri="{FF2B5EF4-FFF2-40B4-BE49-F238E27FC236}">
-                <a16:creationId xmlns:a16="http://schemas.microsoft.com/office/drawing/2014/main" id="{1AEF3ED8-A75C-4318-877C-139C98C0007D}"/>
-              </a:ext>
-            </a:extLst>
-          </p:cNvPr>
-          <p:cNvSpPr>
-            <a:spLocks noGrp="1"/>
-          </p:cNvSpPr>
-          <p:nvPr>
-            <p:ph type="body" sz="quarter" idx="12"/>
-          </p:nvPr>
-        </p:nvSpPr>
-        <p:spPr/>
+        <p:spPr>
+          <a:xfrm>
+            <a:off x="6502400" y="1159555"/>
+            <a:ext cx="5232400" cy="5296700"/>
+          </a:xfrm>
+        </p:spPr>
         <p:txBody>
           <a:bodyPr>
             <a:normAutofit/>
           </a:bodyPr>
           <a:lstStyle/>
           <a:p>
+            <a:pPr algn="just"/>
             <a:r>
               <a:rPr lang="en-US" dirty="0"/>
-              <a:t>Data Structure Techniques used with complexity</a:t>
-            </a:r>
-          </a:p>
-        </p:txBody>
-      </p:sp>
-      <p:sp>
-        <p:nvSpPr>
-          <p:cNvPr id="8" name="Text Placeholder 7">
-            <a:extLst>
-              <a:ext uri="{FF2B5EF4-FFF2-40B4-BE49-F238E27FC236}">
-                <a16:creationId xmlns:a16="http://schemas.microsoft.com/office/drawing/2014/main" id="{D9C2EAA8-D3C6-403B-B439-F95C60D0B3B9}"/>
-              </a:ext>
-            </a:extLst>
-          </p:cNvPr>
-          <p:cNvSpPr>
-            <a:spLocks noGrp="1"/>
-          </p:cNvSpPr>
-          <p:nvPr>
-            <p:ph type="body" sz="quarter" idx="11"/>
+              <a:t>	</a:t>
+            </a:r>
+            <a:r>
+              <a:rPr lang="en-US" sz="1800" dirty="0">
+                <a:latin typeface="Times New Roman" panose="02020603050405020304" pitchFamily="18" charset="0"/>
+                <a:cs typeface="Times New Roman" panose="02020603050405020304" pitchFamily="18" charset="0"/>
+              </a:rPr>
+              <a:t>BodyPix uses the convolutional neural network algorithm. We trained both a ResNet model and a MobileNet model. Although the </a:t>
+            </a:r>
+            <a:r>
+              <a:rPr lang="en-US" sz="1800" dirty="0" err="1">
+                <a:latin typeface="Times New Roman" panose="02020603050405020304" pitchFamily="18" charset="0"/>
+                <a:cs typeface="Times New Roman" panose="02020603050405020304" pitchFamily="18" charset="0"/>
+              </a:rPr>
+              <a:t>ResNet</a:t>
+            </a:r>
+            <a:r>
+              <a:rPr lang="en-US" sz="1800" dirty="0">
+                <a:latin typeface="Times New Roman" panose="02020603050405020304" pitchFamily="18" charset="0"/>
+                <a:cs typeface="Times New Roman" panose="02020603050405020304" pitchFamily="18" charset="0"/>
+              </a:rPr>
+              <a:t> based model is more accurate, this post concerns the MobileNet one which has been open-sourced for its ability to run efficiently on mobile devices and the standard consumer computers. </a:t>
+            </a:r>
+          </a:p>
+          <a:p>
+            <a:pPr algn="just"/>
+            <a:r>
+              <a:rPr lang="en-US" sz="1800" dirty="0">
+                <a:latin typeface="Times New Roman" panose="02020603050405020304" pitchFamily="18" charset="0"/>
+                <a:cs typeface="Times New Roman" panose="02020603050405020304" pitchFamily="18" charset="0"/>
+              </a:rPr>
+              <a:t>	At the core of BodyPix is an algorithm that performs body segmentation — or, in other words, performs a binary decision for each pixel of an input image to estimate whether that pixel belongs to a person or not</a:t>
+            </a:r>
+          </a:p>
+          <a:p>
+            <a:pPr algn="just"/>
+            <a:r>
+              <a:rPr lang="en-US" sz="1800" dirty="0">
+                <a:latin typeface="Times New Roman" panose="02020603050405020304" pitchFamily="18" charset="0"/>
+                <a:cs typeface="Times New Roman" panose="02020603050405020304" pitchFamily="18" charset="0"/>
+              </a:rPr>
+              <a:t>	To estimate the body part segmentation, we use the same MobileNet representation, but this time repeat the above process by predicting </a:t>
+            </a:r>
+            <a:r>
+              <a:rPr lang="en-US" sz="1800" i="1" dirty="0">
+                <a:latin typeface="Times New Roman" panose="02020603050405020304" pitchFamily="18" charset="0"/>
+                <a:cs typeface="Times New Roman" panose="02020603050405020304" pitchFamily="18" charset="0"/>
+              </a:rPr>
+              <a:t>an additional twenty-four</a:t>
+            </a:r>
+            <a:r>
+              <a:rPr lang="en-US" sz="1800" dirty="0">
+                <a:latin typeface="Times New Roman" panose="02020603050405020304" pitchFamily="18" charset="0"/>
+                <a:cs typeface="Times New Roman" panose="02020603050405020304" pitchFamily="18" charset="0"/>
+              </a:rPr>
+              <a:t> channel output tensor P where </a:t>
+            </a:r>
+            <a:r>
+              <a:rPr lang="en-US" sz="1800" i="1" dirty="0">
+                <a:latin typeface="Times New Roman" panose="02020603050405020304" pitchFamily="18" charset="0"/>
+                <a:cs typeface="Times New Roman" panose="02020603050405020304" pitchFamily="18" charset="0"/>
+              </a:rPr>
+              <a:t>twenty-four</a:t>
+            </a:r>
+            <a:r>
+              <a:rPr lang="en-US" sz="1800" dirty="0">
+                <a:latin typeface="Times New Roman" panose="02020603050405020304" pitchFamily="18" charset="0"/>
+                <a:cs typeface="Times New Roman" panose="02020603050405020304" pitchFamily="18" charset="0"/>
+              </a:rPr>
+              <a:t> is the number of body parts.</a:t>
+            </a:r>
+          </a:p>
+        </p:txBody>
+      </p:sp>
+      <p:sp>
+        <p:nvSpPr>
+          <p:cNvPr id="5" name="Title 4">
+            <a:extLst>
+              <a:ext uri="{FF2B5EF4-FFF2-40B4-BE49-F238E27FC236}">
+                <a16:creationId xmlns:a16="http://schemas.microsoft.com/office/drawing/2014/main" id="{96DBE169-BA91-4B17-9AF2-4BAD528BEE06}"/>
+              </a:ext>
+            </a:extLst>
+          </p:cNvPr>
+          <p:cNvSpPr>
+            <a:spLocks noGrp="1"/>
+          </p:cNvSpPr>
+          <p:nvPr>
+            <p:ph type="title"/>
           </p:nvPr>
         </p:nvSpPr>
         <p:spPr/>
@@ -23183,20 +23899,56 @@
           <a:lstStyle/>
           <a:p>
             <a:r>
-              <a:rPr lang="en-US" dirty="0"/>
-              <a:t>Lorem ipsum dolor sit amet, consectetur adipiscing elit. Phasellus auctor efficitur dui et facilisis. Pellentesque habitant morbi tristique senectus et netus et malesuada fames ac turpis egestas. Etiam molestie in quam ac viverra. Cras consequat gravida aliquam. Maecenas cursus eleifend risus, in vulputate velit imperdiet non. Aenean tincidunt euismod ultricies. Fusce tempor dui ipsum, nec ultricies ante eleifend vel curabitur.</a:t>
+              <a:rPr lang="en-US" dirty="0">
+                <a:latin typeface="Times New Roman" panose="02020603050405020304" pitchFamily="18" charset="0"/>
+                <a:cs typeface="Times New Roman" panose="02020603050405020304" pitchFamily="18" charset="0"/>
+              </a:rPr>
+              <a:t>Algorithms</a:t>
+            </a:r>
+          </a:p>
+        </p:txBody>
+      </p:sp>
+      <p:sp>
+        <p:nvSpPr>
+          <p:cNvPr id="66" name="Text Placeholder 65">
+            <a:extLst>
+              <a:ext uri="{FF2B5EF4-FFF2-40B4-BE49-F238E27FC236}">
+                <a16:creationId xmlns:a16="http://schemas.microsoft.com/office/drawing/2014/main" id="{1AEF3ED8-A75C-4318-877C-139C98C0007D}"/>
+              </a:ext>
+            </a:extLst>
+          </p:cNvPr>
+          <p:cNvSpPr>
+            <a:spLocks noGrp="1"/>
+          </p:cNvSpPr>
+          <p:nvPr>
+            <p:ph type="body" sz="quarter" idx="12"/>
+          </p:nvPr>
+        </p:nvSpPr>
+        <p:spPr/>
+        <p:txBody>
+          <a:bodyPr>
+            <a:normAutofit/>
+          </a:bodyPr>
+          <a:lstStyle/>
+          <a:p>
+            <a:r>
+              <a:rPr lang="en-US" dirty="0">
+                <a:latin typeface="Times New Roman" panose="02020603050405020304" pitchFamily="18" charset="0"/>
+                <a:cs typeface="Times New Roman" panose="02020603050405020304" pitchFamily="18" charset="0"/>
+              </a:rPr>
+              <a:t>Data Structure Techniques used with complexity</a:t>
             </a:r>
           </a:p>
         </p:txBody>
       </p:sp>
       <p:pic>
         <p:nvPicPr>
-          <p:cNvPr id="40" name="Picture Placeholder 39" title="Decorative"/>
+          <p:cNvPr id="41" name="Picture Placeholder 40" title="Decorative"/>
           <p:cNvPicPr>
             <a:picLocks noGrp="1" noChangeAspect="1"/>
           </p:cNvPicPr>
           <p:nvPr>
-            <p:ph type="pic" sz="quarter" idx="13"/>
+            <p:ph type="pic" sz="quarter" idx="14"/>
           </p:nvPr>
         </p:nvPicPr>
         <p:blipFill rotWithShape="1">
@@ -23216,123 +23968,61 @@
               </a:ext>
             </a:extLst>
           </a:blip>
-          <a:srcRect l="-14976" t="-18769" r="-20858" b="-17066"/>
+          <a:srcRect l="-13860" t="-15649" r="-14314" b="-12525"/>
           <a:stretch/>
         </p:blipFill>
         <p:spPr>
+          <a:xfrm>
+            <a:off x="8453367" y="401745"/>
+            <a:ext cx="885235" cy="885235"/>
+          </a:xfrm>
           <a:prstGeom prst="rect">
             <a:avLst/>
           </a:prstGeom>
         </p:spPr>
       </p:pic>
-      <p:pic>
-        <p:nvPicPr>
-          <p:cNvPr id="41" name="Picture Placeholder 40" title="Decorative"/>
-          <p:cNvPicPr>
-            <a:picLocks noGrp="1" noChangeAspect="1"/>
-          </p:cNvPicPr>
-          <p:nvPr>
-            <p:ph type="pic" sz="quarter" idx="14"/>
-          </p:nvPr>
-        </p:nvPicPr>
-        <p:blipFill rotWithShape="1">
-          <a:blip r:embed="rId4" cstate="email">
-            <a:extLst>
-              <a:ext uri="{BEBA8EAE-BF5A-486C-A8C5-ECC9F3942E4B}">
-                <a14:imgProps xmlns:a14="http://schemas.microsoft.com/office/drawing/2010/main">
-                  <a14:imgLayer r:embed="rId5">
-                    <a14:imgEffect>
-                      <a14:brightnessContrast bright="-100000"/>
-                    </a14:imgEffect>
-                  </a14:imgLayer>
-                </a14:imgProps>
-              </a:ext>
-              <a:ext uri="{28A0092B-C50C-407E-A947-70E740481C1C}">
-                <a14:useLocalDpi xmlns:a14="http://schemas.microsoft.com/office/drawing/2010/main"/>
-              </a:ext>
-            </a:extLst>
-          </a:blip>
-          <a:srcRect l="-13860" t="-15649" r="-14314" b="-12525"/>
-          <a:stretch/>
-        </p:blipFill>
-        <p:spPr>
+      <p:sp>
+        <p:nvSpPr>
+          <p:cNvPr id="26" name="TextBox 25">
+            <a:extLst>
+              <a:ext uri="{FF2B5EF4-FFF2-40B4-BE49-F238E27FC236}">
+                <a16:creationId xmlns:a16="http://schemas.microsoft.com/office/drawing/2014/main" id="{B3D5256D-0DED-45B5-90C8-2E796DE89E6B}"/>
+              </a:ext>
+            </a:extLst>
+          </p:cNvPr>
+          <p:cNvSpPr txBox="1"/>
+          <p:nvPr/>
+        </p:nvSpPr>
+        <p:spPr>
+          <a:xfrm>
+            <a:off x="660400" y="3598690"/>
+            <a:ext cx="4754880" cy="923330"/>
+          </a:xfrm>
           <a:prstGeom prst="rect">
             <a:avLst/>
           </a:prstGeom>
-        </p:spPr>
-      </p:pic>
-      <p:pic>
-        <p:nvPicPr>
-          <p:cNvPr id="42" name="Picture Placeholder 41" title="Decorative"/>
-          <p:cNvPicPr>
-            <a:picLocks noGrp="1" noChangeAspect="1"/>
-          </p:cNvPicPr>
-          <p:nvPr>
-            <p:ph type="pic" sz="quarter" idx="15"/>
-          </p:nvPr>
-        </p:nvPicPr>
-        <p:blipFill rotWithShape="1">
-          <a:blip r:embed="rId6" cstate="email">
-            <a:extLst>
-              <a:ext uri="{BEBA8EAE-BF5A-486C-A8C5-ECC9F3942E4B}">
-                <a14:imgProps xmlns:a14="http://schemas.microsoft.com/office/drawing/2010/main">
-                  <a14:imgLayer r:embed="rId7">
-                    <a14:imgEffect>
-                      <a14:brightnessContrast bright="-100000"/>
-                    </a14:imgEffect>
-                  </a14:imgLayer>
-                </a14:imgProps>
-              </a:ext>
-              <a:ext uri="{28A0092B-C50C-407E-A947-70E740481C1C}">
-                <a14:useLocalDpi xmlns:a14="http://schemas.microsoft.com/office/drawing/2010/main"/>
-              </a:ext>
-            </a:extLst>
-          </a:blip>
-          <a:srcRect l="-21524" t="-8482" r="-20795" b="-8139"/>
-          <a:stretch/>
-        </p:blipFill>
-        <p:spPr>
-          <a:prstGeom prst="rect">
-            <a:avLst/>
-          </a:prstGeom>
-        </p:spPr>
-      </p:pic>
-      <p:pic>
-        <p:nvPicPr>
-          <p:cNvPr id="43" name="Picture Placeholder 42" title="Decorative"/>
-          <p:cNvPicPr>
-            <a:picLocks noGrp="1" noChangeAspect="1"/>
-          </p:cNvPicPr>
-          <p:nvPr>
-            <p:ph type="pic" sz="quarter" idx="16"/>
-          </p:nvPr>
-        </p:nvPicPr>
-        <p:blipFill rotWithShape="1">
-          <a:blip r:embed="rId8" cstate="email">
-            <a:extLst>
-              <a:ext uri="{BEBA8EAE-BF5A-486C-A8C5-ECC9F3942E4B}">
-                <a14:imgProps xmlns:a14="http://schemas.microsoft.com/office/drawing/2010/main">
-                  <a14:imgLayer r:embed="rId9">
-                    <a14:imgEffect>
-                      <a14:brightnessContrast bright="-100000"/>
-                    </a14:imgEffect>
-                  </a14:imgLayer>
-                </a14:imgProps>
-              </a:ext>
-              <a:ext uri="{28A0092B-C50C-407E-A947-70E740481C1C}">
-                <a14:useLocalDpi xmlns:a14="http://schemas.microsoft.com/office/drawing/2010/main"/>
-              </a:ext>
-            </a:extLst>
-          </a:blip>
-          <a:srcRect l="-8214" t="-9857" r="-9487" b="-7844"/>
-          <a:stretch/>
-        </p:blipFill>
-        <p:spPr>
-          <a:prstGeom prst="rect">
-            <a:avLst/>
-          </a:prstGeom>
-        </p:spPr>
-      </p:pic>
+          <a:noFill/>
+        </p:spPr>
+        <p:txBody>
+          <a:bodyPr wrap="square">
+            <a:spAutoFit/>
+          </a:bodyPr>
+          <a:lstStyle/>
+          <a:p>
+            <a:pPr algn="just"/>
+            <a:r>
+              <a:rPr lang="en-US" sz="1800" dirty="0">
+                <a:solidFill>
+                  <a:schemeClr val="bg1"/>
+                </a:solidFill>
+                <a:latin typeface="Times New Roman" panose="02020603050405020304" pitchFamily="18" charset="0"/>
+                <a:cs typeface="Times New Roman" panose="02020603050405020304" pitchFamily="18" charset="0"/>
+              </a:rPr>
+              <a:t>We using Body pix which is real-time person and body part segmentation in the browser using TensorFlow.js.</a:t>
+            </a:r>
+          </a:p>
+        </p:txBody>
+      </p:sp>
     </p:spTree>
     <p:extLst>
       <p:ext uri="{BB962C8B-B14F-4D97-AF65-F5344CB8AC3E}">
@@ -23382,382 +24072,57 @@
         <p:spPr/>
         <p:txBody>
           <a:bodyPr>
-            <a:normAutofit fontScale="90000"/>
+            <a:normAutofit/>
           </a:bodyPr>
           <a:lstStyle/>
           <a:p>
             <a:r>
               <a:rPr lang="en-US" dirty="0"/>
-              <a:t>ER Diagram ,DFD ,Use Case diagram</a:t>
+              <a:t>ER </a:t>
+            </a:r>
+            <a:r>
+              <a:rPr lang="en-US" dirty="0">
+                <a:latin typeface="Times New Roman" panose="02020603050405020304" pitchFamily="18" charset="0"/>
+                <a:cs typeface="Times New Roman" panose="02020603050405020304" pitchFamily="18" charset="0"/>
+              </a:rPr>
+              <a:t>Diagram</a:t>
+            </a:r>
+            <a:r>
+              <a:rPr lang="en-US" dirty="0"/>
+              <a:t> </a:t>
             </a:r>
           </a:p>
         </p:txBody>
       </p:sp>
       <p:pic>
         <p:nvPicPr>
-          <p:cNvPr id="25" name="Picture Placeholder 23" descr="Member Photo" title="Decorative">
-            <a:extLst>
-              <a:ext uri="{FF2B5EF4-FFF2-40B4-BE49-F238E27FC236}">
-                <a16:creationId xmlns:a16="http://schemas.microsoft.com/office/drawing/2014/main" id="{28471B48-B5D4-4311-8051-3D8458674D12}"/>
+          <p:cNvPr id="8" name="Picture 7">
+            <a:extLst>
+              <a:ext uri="{FF2B5EF4-FFF2-40B4-BE49-F238E27FC236}">
+                <a16:creationId xmlns:a16="http://schemas.microsoft.com/office/drawing/2014/main" id="{396B8312-7F5C-46DA-BBD2-A35DF5B168D4}"/>
               </a:ext>
             </a:extLst>
           </p:cNvPr>
           <p:cNvPicPr>
-            <a:picLocks noGrp="1" noChangeAspect="1"/>
+            <a:picLocks noChangeAspect="1"/>
           </p:cNvPicPr>
-          <p:nvPr>
-            <p:ph type="pic" sz="quarter" idx="11"/>
-          </p:nvPr>
+          <p:nvPr/>
         </p:nvPicPr>
         <p:blipFill>
-          <a:blip r:embed="rId2" cstate="email">
-            <a:grayscl/>
-            <a:extLst>
-              <a:ext uri="{28A0092B-C50C-407E-A947-70E740481C1C}">
-                <a14:useLocalDpi xmlns:a14="http://schemas.microsoft.com/office/drawing/2010/main"/>
-              </a:ext>
-            </a:extLst>
-          </a:blip>
-          <a:srcRect/>
+          <a:blip r:embed="rId2"/>
           <a:stretch>
             <a:fillRect/>
           </a:stretch>
         </p:blipFill>
         <p:spPr>
           <a:xfrm>
-            <a:off x="0" y="4449503"/>
-            <a:ext cx="3054096" cy="2441448"/>
-          </a:xfrm>
-        </p:spPr>
-      </p:pic>
-      <p:pic>
-        <p:nvPicPr>
-          <p:cNvPr id="30" name="Picture Placeholder 27" descr="Member Photo" title="Decorative">
-            <a:extLst>
-              <a:ext uri="{FF2B5EF4-FFF2-40B4-BE49-F238E27FC236}">
-                <a16:creationId xmlns:a16="http://schemas.microsoft.com/office/drawing/2014/main" id="{10D7B446-4830-437D-90F2-78FF39F842A8}"/>
-              </a:ext>
-            </a:extLst>
-          </p:cNvPr>
-          <p:cNvPicPr>
-            <a:picLocks noGrp="1" noChangeAspect="1"/>
-          </p:cNvPicPr>
-          <p:nvPr>
-            <p:ph type="pic" sz="quarter" idx="13"/>
-          </p:nvPr>
-        </p:nvPicPr>
-        <p:blipFill>
-          <a:blip r:embed="rId3" cstate="email">
-            <a:grayscl/>
-            <a:extLst>
-              <a:ext uri="{28A0092B-C50C-407E-A947-70E740481C1C}">
-                <a14:useLocalDpi xmlns:a14="http://schemas.microsoft.com/office/drawing/2010/main"/>
-              </a:ext>
-            </a:extLst>
-          </a:blip>
-          <a:srcRect/>
-          <a:stretch>
-            <a:fillRect/>
-          </a:stretch>
-        </p:blipFill>
-        <p:spPr/>
-      </p:pic>
-      <p:pic>
-        <p:nvPicPr>
-          <p:cNvPr id="31" name="Picture Placeholder 29" descr="Member Photo" title="Decorative">
-            <a:extLst>
-              <a:ext uri="{FF2B5EF4-FFF2-40B4-BE49-F238E27FC236}">
-                <a16:creationId xmlns:a16="http://schemas.microsoft.com/office/drawing/2014/main" id="{7453335E-1D5E-4FDC-8418-75FFB424DE6C}"/>
-              </a:ext>
-            </a:extLst>
-          </p:cNvPr>
-          <p:cNvPicPr>
-            <a:picLocks noGrp="1" noChangeAspect="1"/>
-          </p:cNvPicPr>
-          <p:nvPr>
-            <p:ph type="pic" sz="quarter" idx="14"/>
-          </p:nvPr>
-        </p:nvPicPr>
-        <p:blipFill>
-          <a:blip r:embed="rId4" cstate="email">
-            <a:grayscl/>
-            <a:extLst>
-              <a:ext uri="{28A0092B-C50C-407E-A947-70E740481C1C}">
-                <a14:useLocalDpi xmlns:a14="http://schemas.microsoft.com/office/drawing/2010/main"/>
-              </a:ext>
-            </a:extLst>
-          </a:blip>
-          <a:srcRect/>
-          <a:stretch>
-            <a:fillRect/>
-          </a:stretch>
-        </p:blipFill>
-        <p:spPr/>
-      </p:pic>
-      <p:sp>
-        <p:nvSpPr>
-          <p:cNvPr id="17" name="Text Placeholder 16">
-            <a:extLst>
-              <a:ext uri="{FF2B5EF4-FFF2-40B4-BE49-F238E27FC236}">
-                <a16:creationId xmlns:a16="http://schemas.microsoft.com/office/drawing/2014/main" id="{4E6B8FC3-C6AB-4C05-AB1A-6A425F437168}"/>
-              </a:ext>
-            </a:extLst>
-          </p:cNvPr>
-          <p:cNvSpPr>
-            <a:spLocks noGrp="1"/>
-          </p:cNvSpPr>
-          <p:nvPr>
-            <p:ph type="body" sz="quarter" idx="15"/>
-          </p:nvPr>
-        </p:nvSpPr>
-        <p:spPr/>
-        <p:txBody>
-          <a:bodyPr/>
-          <a:lstStyle/>
-          <a:p>
-            <a:r>
-              <a:rPr lang="en-US" dirty="0"/>
-              <a:t>Lorem ipsum dolor sit amet, consectetur adipiscing elit. </a:t>
-            </a:r>
-          </a:p>
-        </p:txBody>
-      </p:sp>
-      <p:sp>
-        <p:nvSpPr>
-          <p:cNvPr id="18" name="Text Placeholder 17">
-            <a:extLst>
-              <a:ext uri="{FF2B5EF4-FFF2-40B4-BE49-F238E27FC236}">
-                <a16:creationId xmlns:a16="http://schemas.microsoft.com/office/drawing/2014/main" id="{6D905B54-BC78-4D3A-98A7-8BF350FAE60E}"/>
-              </a:ext>
-            </a:extLst>
-          </p:cNvPr>
-          <p:cNvSpPr>
-            <a:spLocks noGrp="1"/>
-          </p:cNvSpPr>
-          <p:nvPr>
-            <p:ph type="body" sz="quarter" idx="16"/>
-          </p:nvPr>
-        </p:nvSpPr>
-        <p:spPr/>
-        <p:txBody>
-          <a:bodyPr/>
-          <a:lstStyle/>
-          <a:p>
-            <a:r>
-              <a:rPr lang="en-US" dirty="0"/>
-              <a:t>ADD NAME</a:t>
-            </a:r>
-          </a:p>
-        </p:txBody>
-      </p:sp>
-      <p:sp>
-        <p:nvSpPr>
-          <p:cNvPr id="19" name="Text Placeholder 18">
-            <a:extLst>
-              <a:ext uri="{FF2B5EF4-FFF2-40B4-BE49-F238E27FC236}">
-                <a16:creationId xmlns:a16="http://schemas.microsoft.com/office/drawing/2014/main" id="{35D841AC-77B9-46F0-877E-EDFD058BCBF2}"/>
-              </a:ext>
-            </a:extLst>
-          </p:cNvPr>
-          <p:cNvSpPr>
-            <a:spLocks noGrp="1"/>
-          </p:cNvSpPr>
-          <p:nvPr>
-            <p:ph type="body" sz="quarter" idx="17"/>
-          </p:nvPr>
-        </p:nvSpPr>
-        <p:spPr/>
-        <p:txBody>
-          <a:bodyPr/>
-          <a:lstStyle/>
-          <a:p>
-            <a:r>
-              <a:rPr lang="en-US" dirty="0"/>
-              <a:t>Lorem ipsum dolor sit amet, consectetur adipiscing elit. </a:t>
-            </a:r>
-          </a:p>
-          <a:p>
-            <a:endParaRPr lang="en-US" dirty="0"/>
-          </a:p>
-        </p:txBody>
-      </p:sp>
-      <p:sp>
-        <p:nvSpPr>
-          <p:cNvPr id="20" name="Text Placeholder 19">
-            <a:extLst>
-              <a:ext uri="{FF2B5EF4-FFF2-40B4-BE49-F238E27FC236}">
-                <a16:creationId xmlns:a16="http://schemas.microsoft.com/office/drawing/2014/main" id="{D20F164F-C51A-49BD-BCBB-07C7BED267C0}"/>
-              </a:ext>
-            </a:extLst>
-          </p:cNvPr>
-          <p:cNvSpPr>
-            <a:spLocks noGrp="1"/>
-          </p:cNvSpPr>
-          <p:nvPr>
-            <p:ph type="body" sz="quarter" idx="18"/>
-          </p:nvPr>
-        </p:nvSpPr>
-        <p:spPr/>
-        <p:txBody>
-          <a:bodyPr/>
-          <a:lstStyle/>
-          <a:p>
-            <a:r>
-              <a:rPr lang="en-US" dirty="0"/>
-              <a:t>ADD NAME</a:t>
-            </a:r>
-          </a:p>
-        </p:txBody>
-      </p:sp>
-      <p:sp>
-        <p:nvSpPr>
-          <p:cNvPr id="21" name="Text Placeholder 20">
-            <a:extLst>
-              <a:ext uri="{FF2B5EF4-FFF2-40B4-BE49-F238E27FC236}">
-                <a16:creationId xmlns:a16="http://schemas.microsoft.com/office/drawing/2014/main" id="{F6997EE2-4A7E-42BA-A9A4-CA8914C6CA1F}"/>
-              </a:ext>
-            </a:extLst>
-          </p:cNvPr>
-          <p:cNvSpPr>
-            <a:spLocks noGrp="1"/>
-          </p:cNvSpPr>
-          <p:nvPr>
-            <p:ph type="body" sz="quarter" idx="19"/>
-          </p:nvPr>
-        </p:nvSpPr>
-        <p:spPr/>
-        <p:txBody>
-          <a:bodyPr/>
-          <a:lstStyle/>
-          <a:p>
-            <a:r>
-              <a:rPr lang="en-US" dirty="0"/>
-              <a:t>Lorem ipsum dolor sit amet, consectetur adipiscing elit. </a:t>
-            </a:r>
-          </a:p>
-          <a:p>
-            <a:endParaRPr lang="en-US" dirty="0"/>
-          </a:p>
-        </p:txBody>
-      </p:sp>
-      <p:sp>
-        <p:nvSpPr>
-          <p:cNvPr id="22" name="Text Placeholder 21">
-            <a:extLst>
-              <a:ext uri="{FF2B5EF4-FFF2-40B4-BE49-F238E27FC236}">
-                <a16:creationId xmlns:a16="http://schemas.microsoft.com/office/drawing/2014/main" id="{3604A973-1FC1-4BD3-A8B8-0C46262D77B6}"/>
-              </a:ext>
-            </a:extLst>
-          </p:cNvPr>
-          <p:cNvSpPr>
-            <a:spLocks noGrp="1"/>
-          </p:cNvSpPr>
-          <p:nvPr>
-            <p:ph type="body" sz="quarter" idx="20"/>
-          </p:nvPr>
-        </p:nvSpPr>
-        <p:spPr/>
-        <p:txBody>
-          <a:bodyPr/>
-          <a:lstStyle/>
-          <a:p>
-            <a:r>
-              <a:rPr lang="en-US" dirty="0"/>
-              <a:t>ADD NAME</a:t>
-            </a:r>
-          </a:p>
-        </p:txBody>
-      </p:sp>
-      <p:sp>
-        <p:nvSpPr>
-          <p:cNvPr id="23" name="Text Placeholder 22">
-            <a:extLst>
-              <a:ext uri="{FF2B5EF4-FFF2-40B4-BE49-F238E27FC236}">
-                <a16:creationId xmlns:a16="http://schemas.microsoft.com/office/drawing/2014/main" id="{F71130C1-E2E7-4700-A220-231BB58349DE}"/>
-              </a:ext>
-            </a:extLst>
-          </p:cNvPr>
-          <p:cNvSpPr>
-            <a:spLocks noGrp="1"/>
-          </p:cNvSpPr>
-          <p:nvPr>
-            <p:ph type="body" sz="quarter" idx="21"/>
-          </p:nvPr>
-        </p:nvSpPr>
-        <p:spPr/>
-        <p:txBody>
-          <a:bodyPr/>
-          <a:lstStyle/>
-          <a:p>
-            <a:r>
-              <a:rPr lang="en-US" dirty="0"/>
-              <a:t>Lorem ipsum dolor sit amet, consectetur adipiscing elit. </a:t>
-            </a:r>
-          </a:p>
-          <a:p>
-            <a:endParaRPr lang="en-US" dirty="0"/>
-          </a:p>
-        </p:txBody>
-      </p:sp>
-      <p:sp>
-        <p:nvSpPr>
-          <p:cNvPr id="24" name="Text Placeholder 23">
-            <a:extLst>
-              <a:ext uri="{FF2B5EF4-FFF2-40B4-BE49-F238E27FC236}">
-                <a16:creationId xmlns:a16="http://schemas.microsoft.com/office/drawing/2014/main" id="{DDC5EC52-0B52-4D0E-B00E-8E5EF35BC9CD}"/>
-              </a:ext>
-            </a:extLst>
-          </p:cNvPr>
-          <p:cNvSpPr>
-            <a:spLocks noGrp="1"/>
-          </p:cNvSpPr>
-          <p:nvPr>
-            <p:ph type="body" sz="quarter" idx="22"/>
-          </p:nvPr>
-        </p:nvSpPr>
-        <p:spPr/>
-        <p:txBody>
-          <a:bodyPr/>
-          <a:lstStyle/>
-          <a:p>
-            <a:r>
-              <a:rPr lang="en-US" dirty="0"/>
-              <a:t>ADD NAME</a:t>
-            </a:r>
-          </a:p>
-        </p:txBody>
-      </p:sp>
-      <p:pic>
-        <p:nvPicPr>
-          <p:cNvPr id="29" name="Picture Placeholder 25" descr="Member Photo" title="Decorative">
-            <a:extLst>
-              <a:ext uri="{FF2B5EF4-FFF2-40B4-BE49-F238E27FC236}">
-                <a16:creationId xmlns:a16="http://schemas.microsoft.com/office/drawing/2014/main" id="{1507C138-F295-471C-A7C2-F827C437DE97}"/>
-              </a:ext>
-            </a:extLst>
-          </p:cNvPr>
-          <p:cNvPicPr>
-            <a:picLocks noGrp="1" noChangeAspect="1"/>
-          </p:cNvPicPr>
-          <p:nvPr>
-            <p:ph type="pic" sz="quarter" idx="12"/>
-          </p:nvPr>
-        </p:nvPicPr>
-        <p:blipFill>
-          <a:blip r:embed="rId5" cstate="email">
-            <a:grayscl/>
-            <a:extLst>
-              <a:ext uri="{28A0092B-C50C-407E-A947-70E740481C1C}">
-                <a14:useLocalDpi xmlns:a14="http://schemas.microsoft.com/office/drawing/2010/main"/>
-              </a:ext>
-            </a:extLst>
-          </a:blip>
-          <a:srcRect/>
-          <a:stretch>
-            <a:fillRect/>
-          </a:stretch>
-        </p:blipFill>
-        <p:spPr/>
+            <a:off x="2026509" y="0"/>
+            <a:ext cx="8452022" cy="4703329"/>
+          </a:xfrm>
+          <a:prstGeom prst="rect">
+            <a:avLst/>
+          </a:prstGeom>
+        </p:spPr>
       </p:pic>
     </p:spTree>
     <p:extLst>

</xml_diff>